<commit_message>
prideti quaternionai, gimbal lock ir forward kinematics
</commit_message>
<xml_diff>
--- a/docs/Presentation/Presentation.pptx
+++ b/docs/Presentation/Presentation.pptx
@@ -1,6 +1,6 @@
 
 <file path=ppt/presentation.xml><?xml version="1.0" encoding="utf-8"?>
-<p:presentation xmlns:a="http://schemas.openxmlformats.org/drawingml/2006/main" xmlns:r="http://schemas.openxmlformats.org/officeDocument/2006/relationships" xmlns:p="http://schemas.openxmlformats.org/presentationml/2006/main" saveSubsetFonts="1">
+<p:presentation xmlns:a="http://schemas.openxmlformats.org/drawingml/2006/main" xmlns:r="http://schemas.openxmlformats.org/officeDocument/2006/relationships" xmlns:mc="http://schemas.openxmlformats.org/markup-compatibility/2006" xmlns:mv="urn:schemas-microsoft-com:mac:vml" xmlns:p="http://schemas.openxmlformats.org/presentationml/2006/main" mc:Ignorable="mv" mc:PreserveAttributes="mv:*" saveSubsetFonts="1">
   <p:sldMasterIdLst>
     <p:sldMasterId id="2147483672" r:id="rId1"/>
   </p:sldMasterIdLst>
@@ -19,18 +19,25 @@
     <p:sldId id="270" r:id="rId13"/>
     <p:sldId id="271" r:id="rId14"/>
     <p:sldId id="272" r:id="rId15"/>
-    <p:sldId id="273" r:id="rId16"/>
-    <p:sldId id="279" r:id="rId17"/>
-    <p:sldId id="274" r:id="rId18"/>
-    <p:sldId id="267" r:id="rId19"/>
-    <p:sldId id="280" r:id="rId20"/>
-    <p:sldId id="275" r:id="rId21"/>
-    <p:sldId id="264" r:id="rId22"/>
-    <p:sldId id="276" r:id="rId23"/>
-    <p:sldId id="277" r:id="rId24"/>
-    <p:sldId id="278" r:id="rId25"/>
-    <p:sldId id="282" r:id="rId26"/>
-    <p:sldId id="258" r:id="rId27"/>
+    <p:sldId id="283" r:id="rId16"/>
+    <p:sldId id="284" r:id="rId17"/>
+    <p:sldId id="285" r:id="rId18"/>
+    <p:sldId id="286" r:id="rId19"/>
+    <p:sldId id="287" r:id="rId20"/>
+    <p:sldId id="288" r:id="rId21"/>
+    <p:sldId id="273" r:id="rId22"/>
+    <p:sldId id="279" r:id="rId23"/>
+    <p:sldId id="274" r:id="rId24"/>
+    <p:sldId id="289" r:id="rId25"/>
+    <p:sldId id="267" r:id="rId26"/>
+    <p:sldId id="280" r:id="rId27"/>
+    <p:sldId id="275" r:id="rId28"/>
+    <p:sldId id="264" r:id="rId29"/>
+    <p:sldId id="276" r:id="rId30"/>
+    <p:sldId id="277" r:id="rId31"/>
+    <p:sldId id="278" r:id="rId32"/>
+    <p:sldId id="282" r:id="rId33"/>
+    <p:sldId id="258" r:id="rId34"/>
   </p:sldIdLst>
   <p:sldSz cx="9144000" cy="6858000" type="screen4x3"/>
   <p:notesSz cx="6858000" cy="9144000"/>
@@ -133,7 +140,7 @@
 </file>
 
 <file path=ppt/slideLayouts/slideLayout1.xml><?xml version="1.0" encoding="utf-8"?>
-<p:sldLayout xmlns:a="http://schemas.openxmlformats.org/drawingml/2006/main" xmlns:r="http://schemas.openxmlformats.org/officeDocument/2006/relationships" xmlns:p="http://schemas.openxmlformats.org/presentationml/2006/main" showMasterSp="0" type="title" preserve="1">
+<p:sldLayout xmlns:a="http://schemas.openxmlformats.org/drawingml/2006/main" xmlns:r="http://schemas.openxmlformats.org/officeDocument/2006/relationships" xmlns:mc="http://schemas.openxmlformats.org/markup-compatibility/2006" xmlns:mv="urn:schemas-microsoft-com:mac:vml" xmlns:p="http://schemas.openxmlformats.org/presentationml/2006/main" mc:Ignorable="mv" mc:PreserveAttributes="mv:*" showMasterSp="0" type="title" preserve="1">
   <p:cSld name="Title Slide">
     <p:spTree>
       <p:nvGrpSpPr>
@@ -212,9 +219,7 @@
         </p:style>
         <p:txBody>
           <a:bodyPr anchor="ctr"/>
-          <a:lstStyle>
-            <a:extLst/>
-          </a:lstStyle>
+          <a:lstStyle/>
           <a:p>
             <a:pPr algn="ctr" eaLnBrk="1" latinLnBrk="0" hangingPunct="1"/>
             <a:endParaRPr kumimoji="0" lang="en-US" dirty="0"/>
@@ -263,7 +268,6 @@
                 </a:effectLst>
               </a:defRPr>
             </a:lvl1pPr>
-            <a:extLst/>
           </a:lstStyle>
           <a:p>
             <a:r>
@@ -325,7 +329,6 @@
             <a:lvl9pPr marL="3657600" indent="0" algn="ctr">
               <a:buNone/>
             </a:lvl9pPr>
-            <a:extLst/>
           </a:lstStyle>
           <a:p>
             <a:r>
@@ -427,9 +430,7 @@
           </p:spPr>
           <p:txBody>
             <a:bodyPr vert="horz" wrap="square" lIns="91440" tIns="45720" rIns="91440" bIns="45720" anchor="t" compatLnSpc="1"/>
-            <a:lstStyle>
-              <a:extLst/>
-            </a:lstStyle>
+            <a:lstStyle/>
             <a:p>
               <a:endParaRPr kumimoji="0" lang="en-US" dirty="0"/>
             </a:p>
@@ -509,9 +510,7 @@
           </p:spPr>
           <p:txBody>
             <a:bodyPr vert="horz" wrap="square" lIns="91440" tIns="45720" rIns="91440" bIns="45720" anchor="t" compatLnSpc="1"/>
-            <a:lstStyle>
-              <a:extLst/>
-            </a:lstStyle>
+            <a:lstStyle/>
             <a:p>
               <a:endParaRPr kumimoji="0" lang="en-US" dirty="0"/>
             </a:p>
@@ -668,9 +667,7 @@
           </p:style>
           <p:txBody>
             <a:bodyPr vert="horz" wrap="square" lIns="91440" tIns="45720" rIns="91440" bIns="45720" anchor="ctr" compatLnSpc="1"/>
-            <a:lstStyle>
-              <a:extLst/>
-            </a:lstStyle>
+            <a:lstStyle/>
             <a:p>
               <a:pPr algn="ctr" eaLnBrk="1" latinLnBrk="0" hangingPunct="1"/>
               <a:endParaRPr kumimoji="0" lang="en-US" dirty="0"/>
@@ -752,13 +749,12 @@
                 </a:solidFill>
               </a:defRPr>
             </a:lvl1pPr>
-            <a:extLst/>
           </a:lstStyle>
           <a:p>
             <a:fld id="{8900D071-D45E-4DB1-8026-6607FD7943F8}" type="datetimeFigureOut">
               <a:rPr lang="lt-LT" smtClean="0"/>
               <a:pPr/>
-              <a:t>2009.01.22</a:t>
+              <a:t>1/22/09</a:t>
             </a:fld>
             <a:endParaRPr lang="lt-LT"/>
           </a:p>
@@ -787,7 +783,6 @@
                 </a:solidFill>
               </a:defRPr>
             </a:lvl1pPr>
-            <a:extLst/>
           </a:lstStyle>
           <a:p>
             <a:endParaRPr lang="lt-LT"/>
@@ -815,7 +810,6 @@
                 </a:solidFill>
               </a:defRPr>
             </a:lvl1pPr>
-            <a:extLst/>
           </a:lstStyle>
           <a:p>
             <a:fld id="{D01D3B16-9DD8-4C37-8DF4-243418B31B2B}" type="slidenum">
@@ -836,7 +830,7 @@
 </file>
 
 <file path=ppt/slideLayouts/slideLayout10.xml><?xml version="1.0" encoding="utf-8"?>
-<p:sldLayout xmlns:a="http://schemas.openxmlformats.org/drawingml/2006/main" xmlns:r="http://schemas.openxmlformats.org/officeDocument/2006/relationships" xmlns:p="http://schemas.openxmlformats.org/presentationml/2006/main" type="vertTx" preserve="1">
+<p:sldLayout xmlns:a="http://schemas.openxmlformats.org/drawingml/2006/main" xmlns:r="http://schemas.openxmlformats.org/officeDocument/2006/relationships" xmlns:mc="http://schemas.openxmlformats.org/markup-compatibility/2006" xmlns:mv="urn:schemas-microsoft-com:mac:vml" xmlns:p="http://schemas.openxmlformats.org/presentationml/2006/main" mc:Ignorable="mv" mc:PreserveAttributes="mv:*" type="vertTx" preserve="1">
   <p:cSld name="Title and Vertical Text">
     <p:spTree>
       <p:nvGrpSpPr>
@@ -865,9 +859,7 @@
         <p:spPr/>
         <p:txBody>
           <a:bodyPr/>
-          <a:lstStyle>
-            <a:extLst/>
-          </a:lstStyle>
+          <a:lstStyle/>
           <a:p>
             <a:r>
               <a:rPr kumimoji="0" lang="en-US" smtClean="0"/>
@@ -895,9 +887,7 @@
         </p:spPr>
         <p:txBody>
           <a:bodyPr vert="eaVert"/>
-          <a:lstStyle>
-            <a:extLst/>
-          </a:lstStyle>
+          <a:lstStyle/>
           <a:p>
             <a:pPr lvl="0" eaLnBrk="1" latinLnBrk="0" hangingPunct="1"/>
             <a:r>
@@ -949,14 +939,12 @@
         <p:spPr/>
         <p:txBody>
           <a:bodyPr/>
-          <a:lstStyle>
-            <a:extLst/>
-          </a:lstStyle>
+          <a:lstStyle/>
           <a:p>
             <a:fld id="{8900D071-D45E-4DB1-8026-6607FD7943F8}" type="datetimeFigureOut">
               <a:rPr lang="lt-LT" smtClean="0"/>
               <a:pPr/>
-              <a:t>2009.01.22</a:t>
+              <a:t>1/22/09</a:t>
             </a:fld>
             <a:endParaRPr lang="lt-LT"/>
           </a:p>
@@ -975,9 +963,7 @@
         <p:spPr/>
         <p:txBody>
           <a:bodyPr/>
-          <a:lstStyle>
-            <a:extLst/>
-          </a:lstStyle>
+          <a:lstStyle/>
           <a:p>
             <a:endParaRPr lang="lt-LT"/>
           </a:p>
@@ -996,9 +982,7 @@
         <p:spPr/>
         <p:txBody>
           <a:bodyPr/>
-          <a:lstStyle>
-            <a:extLst/>
-          </a:lstStyle>
+          <a:lstStyle/>
           <a:p>
             <a:fld id="{D01D3B16-9DD8-4C37-8DF4-243418B31B2B}" type="slidenum">
               <a:rPr lang="lt-LT" smtClean="0"/>
@@ -1018,7 +1002,7 @@
 </file>
 
 <file path=ppt/slideLayouts/slideLayout11.xml><?xml version="1.0" encoding="utf-8"?>
-<p:sldLayout xmlns:a="http://schemas.openxmlformats.org/drawingml/2006/main" xmlns:r="http://schemas.openxmlformats.org/officeDocument/2006/relationships" xmlns:p="http://schemas.openxmlformats.org/presentationml/2006/main" type="vertTitleAndTx" preserve="1">
+<p:sldLayout xmlns:a="http://schemas.openxmlformats.org/drawingml/2006/main" xmlns:r="http://schemas.openxmlformats.org/officeDocument/2006/relationships" xmlns:mc="http://schemas.openxmlformats.org/markup-compatibility/2006" xmlns:mv="urn:schemas-microsoft-com:mac:vml" xmlns:p="http://schemas.openxmlformats.org/presentationml/2006/main" mc:Ignorable="mv" mc:PreserveAttributes="mv:*" type="vertTitleAndTx" preserve="1">
   <p:cSld name="Vertical Title and Text">
     <p:spTree>
       <p:nvGrpSpPr>
@@ -1052,9 +1036,7 @@
         </p:spPr>
         <p:txBody>
           <a:bodyPr vert="eaVert"/>
-          <a:lstStyle>
-            <a:extLst/>
-          </a:lstStyle>
+          <a:lstStyle/>
           <a:p>
             <a:r>
               <a:rPr kumimoji="0" lang="en-US" smtClean="0"/>
@@ -1082,9 +1064,7 @@
         </p:spPr>
         <p:txBody>
           <a:bodyPr vert="eaVert"/>
-          <a:lstStyle>
-            <a:extLst/>
-          </a:lstStyle>
+          <a:lstStyle/>
           <a:p>
             <a:pPr lvl="0" eaLnBrk="1" latinLnBrk="0" hangingPunct="1"/>
             <a:r>
@@ -1136,14 +1116,12 @@
         <p:spPr/>
         <p:txBody>
           <a:bodyPr/>
-          <a:lstStyle>
-            <a:extLst/>
-          </a:lstStyle>
+          <a:lstStyle/>
           <a:p>
             <a:fld id="{8900D071-D45E-4DB1-8026-6607FD7943F8}" type="datetimeFigureOut">
               <a:rPr lang="lt-LT" smtClean="0"/>
               <a:pPr/>
-              <a:t>2009.01.22</a:t>
+              <a:t>1/22/09</a:t>
             </a:fld>
             <a:endParaRPr lang="lt-LT"/>
           </a:p>
@@ -1162,9 +1140,7 @@
         <p:spPr/>
         <p:txBody>
           <a:bodyPr/>
-          <a:lstStyle>
-            <a:extLst/>
-          </a:lstStyle>
+          <a:lstStyle/>
           <a:p>
             <a:endParaRPr lang="lt-LT"/>
           </a:p>
@@ -1183,9 +1159,7 @@
         <p:spPr/>
         <p:txBody>
           <a:bodyPr/>
-          <a:lstStyle>
-            <a:extLst/>
-          </a:lstStyle>
+          <a:lstStyle/>
           <a:p>
             <a:fld id="{D01D3B16-9DD8-4C37-8DF4-243418B31B2B}" type="slidenum">
               <a:rPr lang="lt-LT" smtClean="0"/>
@@ -1205,7 +1179,7 @@
 </file>
 
 <file path=ppt/slideLayouts/slideLayout2.xml><?xml version="1.0" encoding="utf-8"?>
-<p:sldLayout xmlns:a="http://schemas.openxmlformats.org/drawingml/2006/main" xmlns:r="http://schemas.openxmlformats.org/officeDocument/2006/relationships" xmlns:p="http://schemas.openxmlformats.org/presentationml/2006/main" type="obj" preserve="1">
+<p:sldLayout xmlns:a="http://schemas.openxmlformats.org/drawingml/2006/main" xmlns:r="http://schemas.openxmlformats.org/officeDocument/2006/relationships" xmlns:mc="http://schemas.openxmlformats.org/markup-compatibility/2006" xmlns:mv="urn:schemas-microsoft-com:mac:vml" xmlns:p="http://schemas.openxmlformats.org/presentationml/2006/main" mc:Ignorable="mv" mc:PreserveAttributes="mv:*" type="obj" preserve="1">
   <p:cSld name="Title and Content">
     <p:spTree>
       <p:nvGrpSpPr>
@@ -1234,9 +1208,7 @@
         <p:spPr/>
         <p:txBody>
           <a:bodyPr/>
-          <a:lstStyle>
-            <a:extLst/>
-          </a:lstStyle>
+          <a:lstStyle/>
           <a:p>
             <a:pPr lvl="0" eaLnBrk="1" latinLnBrk="0" hangingPunct="1"/>
             <a:r>
@@ -1288,14 +1260,12 @@
         <p:spPr/>
         <p:txBody>
           <a:bodyPr/>
-          <a:lstStyle>
-            <a:extLst/>
-          </a:lstStyle>
+          <a:lstStyle/>
           <a:p>
             <a:fld id="{8900D071-D45E-4DB1-8026-6607FD7943F8}" type="datetimeFigureOut">
               <a:rPr lang="lt-LT" smtClean="0"/>
               <a:pPr/>
-              <a:t>2009.01.22</a:t>
+              <a:t>1/22/09</a:t>
             </a:fld>
             <a:endParaRPr lang="lt-LT"/>
           </a:p>
@@ -1314,9 +1284,7 @@
         <p:spPr/>
         <p:txBody>
           <a:bodyPr/>
-          <a:lstStyle>
-            <a:extLst/>
-          </a:lstStyle>
+          <a:lstStyle/>
           <a:p>
             <a:endParaRPr lang="lt-LT"/>
           </a:p>
@@ -1335,9 +1303,7 @@
         <p:spPr/>
         <p:txBody>
           <a:bodyPr/>
-          <a:lstStyle>
-            <a:extLst/>
-          </a:lstStyle>
+          <a:lstStyle/>
           <a:p>
             <a:fld id="{D01D3B16-9DD8-4C37-8DF4-243418B31B2B}" type="slidenum">
               <a:rPr lang="lt-LT" smtClean="0"/>
@@ -1361,9 +1327,7 @@
         <p:spPr/>
         <p:txBody>
           <a:bodyPr rtlCol="0"/>
-          <a:lstStyle>
-            <a:extLst/>
-          </a:lstStyle>
+          <a:lstStyle/>
           <a:p>
             <a:r>
               <a:rPr kumimoji="0" lang="en-US" smtClean="0"/>
@@ -1382,7 +1346,7 @@
 </file>
 
 <file path=ppt/slideLayouts/slideLayout3.xml><?xml version="1.0" encoding="utf-8"?>
-<p:sldLayout xmlns:a="http://schemas.openxmlformats.org/drawingml/2006/main" xmlns:r="http://schemas.openxmlformats.org/officeDocument/2006/relationships" xmlns:p="http://schemas.openxmlformats.org/presentationml/2006/main" type="secHead" preserve="1">
+<p:sldLayout xmlns:a="http://schemas.openxmlformats.org/drawingml/2006/main" xmlns:r="http://schemas.openxmlformats.org/officeDocument/2006/relationships" xmlns:mc="http://schemas.openxmlformats.org/markup-compatibility/2006" xmlns:mv="urn:schemas-microsoft-com:mac:vml" xmlns:p="http://schemas.openxmlformats.org/presentationml/2006/main" mc:Ignorable="mv" mc:PreserveAttributes="mv:*" type="secHead" preserve="1">
   <p:cSld name="Section Header">
     <p:bg>
       <p:bgRef idx="1002">
@@ -1443,7 +1407,6 @@
                 </a:effectLst>
               </a:defRPr>
             </a:lvl1pPr>
-            <a:extLst/>
           </a:lstStyle>
           <a:p>
             <a:r>
@@ -1521,7 +1484,6 @@
                 </a:solidFill>
               </a:defRPr>
             </a:lvl5pPr>
-            <a:extLst/>
           </a:lstStyle>
           <a:p>
             <a:pPr lvl="0" eaLnBrk="1" latinLnBrk="0" hangingPunct="1"/>
@@ -1545,14 +1507,12 @@
         <p:spPr/>
         <p:txBody>
           <a:bodyPr/>
-          <a:lstStyle>
-            <a:extLst/>
-          </a:lstStyle>
+          <a:lstStyle/>
           <a:p>
             <a:fld id="{8900D071-D45E-4DB1-8026-6607FD7943F8}" type="datetimeFigureOut">
               <a:rPr lang="lt-LT" smtClean="0"/>
               <a:pPr/>
-              <a:t>2009.01.22</a:t>
+              <a:t>1/22/09</a:t>
             </a:fld>
             <a:endParaRPr lang="lt-LT"/>
           </a:p>
@@ -1571,9 +1531,7 @@
         <p:spPr/>
         <p:txBody>
           <a:bodyPr/>
-          <a:lstStyle>
-            <a:extLst/>
-          </a:lstStyle>
+          <a:lstStyle/>
           <a:p>
             <a:endParaRPr lang="lt-LT"/>
           </a:p>
@@ -1592,9 +1550,7 @@
         <p:spPr/>
         <p:txBody>
           <a:bodyPr/>
-          <a:lstStyle>
-            <a:extLst/>
-          </a:lstStyle>
+          <a:lstStyle/>
           <a:p>
             <a:fld id="{D01D3B16-9DD8-4C37-8DF4-243418B31B2B}" type="slidenum">
               <a:rPr lang="lt-LT" smtClean="0"/>
@@ -1676,9 +1632,7 @@
         </p:style>
         <p:txBody>
           <a:bodyPr anchor="ctr"/>
-          <a:lstStyle>
-            <a:extLst/>
-          </a:lstStyle>
+          <a:lstStyle/>
           <a:p>
             <a:pPr algn="l" eaLnBrk="1" latinLnBrk="0" hangingPunct="1"/>
             <a:endParaRPr kumimoji="0" lang="en-US" dirty="0"/>
@@ -1756,9 +1710,7 @@
         </p:style>
         <p:txBody>
           <a:bodyPr anchor="ctr"/>
-          <a:lstStyle>
-            <a:extLst/>
-          </a:lstStyle>
+          <a:lstStyle/>
           <a:p>
             <a:pPr algn="l" eaLnBrk="1" latinLnBrk="0" hangingPunct="1"/>
             <a:endParaRPr kumimoji="0" lang="en-US" dirty="0"/>
@@ -1774,7 +1726,7 @@
 </file>
 
 <file path=ppt/slideLayouts/slideLayout4.xml><?xml version="1.0" encoding="utf-8"?>
-<p:sldLayout xmlns:a="http://schemas.openxmlformats.org/drawingml/2006/main" xmlns:r="http://schemas.openxmlformats.org/officeDocument/2006/relationships" xmlns:p="http://schemas.openxmlformats.org/presentationml/2006/main" type="twoObj" preserve="1">
+<p:sldLayout xmlns:a="http://schemas.openxmlformats.org/drawingml/2006/main" xmlns:r="http://schemas.openxmlformats.org/officeDocument/2006/relationships" xmlns:mc="http://schemas.openxmlformats.org/markup-compatibility/2006" xmlns:mv="urn:schemas-microsoft-com:mac:vml" xmlns:p="http://schemas.openxmlformats.org/presentationml/2006/main" mc:Ignorable="mv" mc:PreserveAttributes="mv:*" type="twoObj" preserve="1">
   <p:cSld name="Two Content">
     <p:bg>
       <p:bgRef idx="1002">
@@ -1829,7 +1781,6 @@
             <a:lvl5pPr>
               <a:defRPr sz="1800"/>
             </a:lvl5pPr>
-            <a:extLst/>
           </a:lstStyle>
           <a:p>
             <a:pPr lvl="0" eaLnBrk="1" latinLnBrk="0" hangingPunct="1"/>
@@ -1903,7 +1854,6 @@
             <a:lvl5pPr>
               <a:defRPr sz="1800"/>
             </a:lvl5pPr>
-            <a:extLst/>
           </a:lstStyle>
           <a:p>
             <a:pPr lvl="0" eaLnBrk="1" latinLnBrk="0" hangingPunct="1"/>
@@ -1956,14 +1906,12 @@
         <p:spPr/>
         <p:txBody>
           <a:bodyPr/>
-          <a:lstStyle>
-            <a:extLst/>
-          </a:lstStyle>
+          <a:lstStyle/>
           <a:p>
             <a:fld id="{8900D071-D45E-4DB1-8026-6607FD7943F8}" type="datetimeFigureOut">
               <a:rPr lang="lt-LT" smtClean="0"/>
               <a:pPr/>
-              <a:t>2009.01.22</a:t>
+              <a:t>1/22/09</a:t>
             </a:fld>
             <a:endParaRPr lang="lt-LT"/>
           </a:p>
@@ -1982,9 +1930,7 @@
         <p:spPr/>
         <p:txBody>
           <a:bodyPr/>
-          <a:lstStyle>
-            <a:extLst/>
-          </a:lstStyle>
+          <a:lstStyle/>
           <a:p>
             <a:endParaRPr lang="lt-LT"/>
           </a:p>
@@ -2003,9 +1949,7 @@
         <p:spPr/>
         <p:txBody>
           <a:bodyPr/>
-          <a:lstStyle>
-            <a:extLst/>
-          </a:lstStyle>
+          <a:lstStyle/>
           <a:p>
             <a:fld id="{D01D3B16-9DD8-4C37-8DF4-243418B31B2B}" type="slidenum">
               <a:rPr lang="lt-LT" smtClean="0"/>
@@ -2029,9 +1973,7 @@
         <p:spPr/>
         <p:txBody>
           <a:bodyPr rtlCol="0"/>
-          <a:lstStyle>
-            <a:extLst/>
-          </a:lstStyle>
+          <a:lstStyle/>
           <a:p>
             <a:r>
               <a:rPr kumimoji="0" lang="en-US" smtClean="0"/>
@@ -2050,7 +1992,7 @@
 </file>
 
 <file path=ppt/slideLayouts/slideLayout5.xml><?xml version="1.0" encoding="utf-8"?>
-<p:sldLayout xmlns:a="http://schemas.openxmlformats.org/drawingml/2006/main" xmlns:r="http://schemas.openxmlformats.org/officeDocument/2006/relationships" xmlns:p="http://schemas.openxmlformats.org/presentationml/2006/main" showMasterSp="0" type="twoTxTwoObj" preserve="1">
+<p:sldLayout xmlns:a="http://schemas.openxmlformats.org/drawingml/2006/main" xmlns:r="http://schemas.openxmlformats.org/officeDocument/2006/relationships" xmlns:mc="http://schemas.openxmlformats.org/markup-compatibility/2006" xmlns:mv="urn:schemas-microsoft-com:mac:vml" xmlns:p="http://schemas.openxmlformats.org/presentationml/2006/main" mc:Ignorable="mv" mc:PreserveAttributes="mv:*" showMasterSp="0" type="twoTxTwoObj" preserve="1">
   <p:cSld name="Comparison">
     <p:bg>
       <p:bgRef idx="1003">
@@ -2093,7 +2035,6 @@
             <a:lvl1pPr>
               <a:defRPr/>
             </a:lvl1pPr>
-            <a:extLst/>
           </a:lstStyle>
           <a:p>
             <a:r>
@@ -2156,7 +2097,6 @@
               <a:buNone/>
               <a:defRPr sz="1600" b="1"/>
             </a:lvl5pPr>
-            <a:extLst/>
           </a:lstStyle>
           <a:p>
             <a:pPr lvl="0" eaLnBrk="1" latinLnBrk="0" hangingPunct="1"/>
@@ -2219,7 +2159,6 @@
               <a:buNone/>
               <a:defRPr sz="1600" b="1"/>
             </a:lvl5pPr>
-            <a:extLst/>
           </a:lstStyle>
           <a:p>
             <a:pPr lvl="0" eaLnBrk="1" latinLnBrk="0" hangingPunct="1"/>
@@ -2269,7 +2208,6 @@
             <a:lvl5pPr>
               <a:defRPr sz="1600"/>
             </a:lvl5pPr>
-            <a:extLst/>
           </a:lstStyle>
           <a:p>
             <a:pPr lvl="0" eaLnBrk="1" latinLnBrk="0" hangingPunct="1"/>
@@ -2351,7 +2289,6 @@
             <a:lvl5pPr>
               <a:defRPr sz="1600"/>
             </a:lvl5pPr>
-            <a:extLst/>
           </a:lstStyle>
           <a:p>
             <a:pPr lvl="0" eaLnBrk="1" latinLnBrk="0" hangingPunct="1"/>
@@ -2404,14 +2341,12 @@
         <p:spPr/>
         <p:txBody>
           <a:bodyPr/>
-          <a:lstStyle>
-            <a:extLst/>
-          </a:lstStyle>
+          <a:lstStyle/>
           <a:p>
             <a:fld id="{8900D071-D45E-4DB1-8026-6607FD7943F8}" type="datetimeFigureOut">
               <a:rPr lang="lt-LT" smtClean="0"/>
               <a:pPr/>
-              <a:t>2009.01.22</a:t>
+              <a:t>1/22/09</a:t>
             </a:fld>
             <a:endParaRPr lang="lt-LT"/>
           </a:p>
@@ -2430,9 +2365,7 @@
         <p:spPr/>
         <p:txBody>
           <a:bodyPr/>
-          <a:lstStyle>
-            <a:extLst/>
-          </a:lstStyle>
+          <a:lstStyle/>
           <a:p>
             <a:endParaRPr lang="lt-LT"/>
           </a:p>
@@ -2451,9 +2384,7 @@
         <p:spPr/>
         <p:txBody>
           <a:bodyPr/>
-          <a:lstStyle>
-            <a:extLst/>
-          </a:lstStyle>
+          <a:lstStyle/>
           <a:p>
             <a:fld id="{D01D3B16-9DD8-4C37-8DF4-243418B31B2B}" type="slidenum">
               <a:rPr lang="lt-LT" smtClean="0"/>
@@ -2473,7 +2404,7 @@
 </file>
 
 <file path=ppt/slideLayouts/slideLayout6.xml><?xml version="1.0" encoding="utf-8"?>
-<p:sldLayout xmlns:a="http://schemas.openxmlformats.org/drawingml/2006/main" xmlns:r="http://schemas.openxmlformats.org/officeDocument/2006/relationships" xmlns:p="http://schemas.openxmlformats.org/presentationml/2006/main" type="titleOnly" preserve="1">
+<p:sldLayout xmlns:a="http://schemas.openxmlformats.org/drawingml/2006/main" xmlns:r="http://schemas.openxmlformats.org/officeDocument/2006/relationships" xmlns:mc="http://schemas.openxmlformats.org/markup-compatibility/2006" xmlns:mv="urn:schemas-microsoft-com:mac:vml" xmlns:p="http://schemas.openxmlformats.org/presentationml/2006/main" mc:Ignorable="mv" mc:PreserveAttributes="mv:*" type="titleOnly" preserve="1">
   <p:cSld name="Title Only">
     <p:bg>
       <p:bgRef idx="1002">
@@ -2507,14 +2438,12 @@
         <p:spPr/>
         <p:txBody>
           <a:bodyPr/>
-          <a:lstStyle>
-            <a:extLst/>
-          </a:lstStyle>
+          <a:lstStyle/>
           <a:p>
             <a:fld id="{8900D071-D45E-4DB1-8026-6607FD7943F8}" type="datetimeFigureOut">
               <a:rPr lang="lt-LT" smtClean="0"/>
               <a:pPr/>
-              <a:t>2009.01.22</a:t>
+              <a:t>1/22/09</a:t>
             </a:fld>
             <a:endParaRPr lang="lt-LT"/>
           </a:p>
@@ -2533,9 +2462,7 @@
         <p:spPr/>
         <p:txBody>
           <a:bodyPr/>
-          <a:lstStyle>
-            <a:extLst/>
-          </a:lstStyle>
+          <a:lstStyle/>
           <a:p>
             <a:endParaRPr lang="lt-LT"/>
           </a:p>
@@ -2554,9 +2481,7 @@
         <p:spPr/>
         <p:txBody>
           <a:bodyPr/>
-          <a:lstStyle>
-            <a:extLst/>
-          </a:lstStyle>
+          <a:lstStyle/>
           <a:p>
             <a:fld id="{D01D3B16-9DD8-4C37-8DF4-243418B31B2B}" type="slidenum">
               <a:rPr lang="lt-LT" smtClean="0"/>
@@ -2580,9 +2505,7 @@
         <p:spPr/>
         <p:txBody>
           <a:bodyPr rtlCol="0"/>
-          <a:lstStyle>
-            <a:extLst/>
-          </a:lstStyle>
+          <a:lstStyle/>
           <a:p>
             <a:r>
               <a:rPr kumimoji="0" lang="en-US" smtClean="0"/>
@@ -2601,7 +2524,7 @@
 </file>
 
 <file path=ppt/slideLayouts/slideLayout7.xml><?xml version="1.0" encoding="utf-8"?>
-<p:sldLayout xmlns:a="http://schemas.openxmlformats.org/drawingml/2006/main" xmlns:r="http://schemas.openxmlformats.org/officeDocument/2006/relationships" xmlns:p="http://schemas.openxmlformats.org/presentationml/2006/main" type="blank" preserve="1">
+<p:sldLayout xmlns:a="http://schemas.openxmlformats.org/drawingml/2006/main" xmlns:r="http://schemas.openxmlformats.org/officeDocument/2006/relationships" xmlns:mc="http://schemas.openxmlformats.org/markup-compatibility/2006" xmlns:mv="urn:schemas-microsoft-com:mac:vml" xmlns:p="http://schemas.openxmlformats.org/presentationml/2006/main" mc:Ignorable="mv" mc:PreserveAttributes="mv:*" type="blank" preserve="1">
   <p:cSld name="Blank">
     <p:spTree>
       <p:nvGrpSpPr>
@@ -2630,14 +2553,12 @@
         <p:spPr/>
         <p:txBody>
           <a:bodyPr/>
-          <a:lstStyle>
-            <a:extLst/>
-          </a:lstStyle>
+          <a:lstStyle/>
           <a:p>
             <a:fld id="{8900D071-D45E-4DB1-8026-6607FD7943F8}" type="datetimeFigureOut">
               <a:rPr lang="lt-LT" smtClean="0"/>
               <a:pPr/>
-              <a:t>2009.01.22</a:t>
+              <a:t>1/22/09</a:t>
             </a:fld>
             <a:endParaRPr lang="lt-LT"/>
           </a:p>
@@ -2656,9 +2577,7 @@
         <p:spPr/>
         <p:txBody>
           <a:bodyPr/>
-          <a:lstStyle>
-            <a:extLst/>
-          </a:lstStyle>
+          <a:lstStyle/>
           <a:p>
             <a:endParaRPr lang="lt-LT"/>
           </a:p>
@@ -2677,9 +2596,7 @@
         <p:spPr/>
         <p:txBody>
           <a:bodyPr/>
-          <a:lstStyle>
-            <a:extLst/>
-          </a:lstStyle>
+          <a:lstStyle/>
           <a:p>
             <a:fld id="{D01D3B16-9DD8-4C37-8DF4-243418B31B2B}" type="slidenum">
               <a:rPr lang="lt-LT" smtClean="0"/>
@@ -2699,7 +2616,7 @@
 </file>
 
 <file path=ppt/slideLayouts/slideLayout8.xml><?xml version="1.0" encoding="utf-8"?>
-<p:sldLayout xmlns:a="http://schemas.openxmlformats.org/drawingml/2006/main" xmlns:r="http://schemas.openxmlformats.org/officeDocument/2006/relationships" xmlns:p="http://schemas.openxmlformats.org/presentationml/2006/main" showMasterSp="0" type="objTx" preserve="1">
+<p:sldLayout xmlns:a="http://schemas.openxmlformats.org/drawingml/2006/main" xmlns:r="http://schemas.openxmlformats.org/officeDocument/2006/relationships" xmlns:mc="http://schemas.openxmlformats.org/markup-compatibility/2006" xmlns:mv="urn:schemas-microsoft-com:mac:vml" xmlns:p="http://schemas.openxmlformats.org/presentationml/2006/main" mc:Ignorable="mv" mc:PreserveAttributes="mv:*" showMasterSp="0" type="objTx" preserve="1">
   <p:cSld name="Content with Caption">
     <p:bg>
       <p:bgRef idx="1003">
@@ -2753,7 +2670,6 @@
                 <a:effectLst/>
               </a:defRPr>
             </a:lvl1pPr>
-            <a:extLst/>
           </a:lstStyle>
           <a:p>
             <a:r>
@@ -2803,7 +2719,6 @@
               <a:buNone/>
               <a:defRPr sz="900"/>
             </a:lvl5pPr>
-            <a:extLst/>
           </a:lstStyle>
           <a:p>
             <a:pPr lvl="0" eaLnBrk="1" latinLnBrk="0" hangingPunct="1"/>
@@ -2848,7 +2763,6 @@
             <a:lvl5pPr>
               <a:defRPr sz="2000"/>
             </a:lvl5pPr>
-            <a:extLst/>
           </a:lstStyle>
           <a:p>
             <a:pPr lvl="0" eaLnBrk="1" latinLnBrk="0" hangingPunct="1"/>
@@ -2906,14 +2820,12 @@
         </p:spPr>
         <p:txBody>
           <a:bodyPr/>
-          <a:lstStyle>
-            <a:extLst/>
-          </a:lstStyle>
+          <a:lstStyle/>
           <a:p>
             <a:fld id="{8900D071-D45E-4DB1-8026-6607FD7943F8}" type="datetimeFigureOut">
               <a:rPr lang="lt-LT" smtClean="0"/>
               <a:pPr/>
-              <a:t>2009.01.22</a:t>
+              <a:t>1/22/09</a:t>
             </a:fld>
             <a:endParaRPr lang="lt-LT"/>
           </a:p>
@@ -2932,9 +2844,7 @@
         <p:spPr/>
         <p:txBody>
           <a:bodyPr/>
-          <a:lstStyle>
-            <a:extLst/>
-          </a:lstStyle>
+          <a:lstStyle/>
           <a:p>
             <a:endParaRPr lang="lt-LT"/>
           </a:p>
@@ -2953,9 +2863,7 @@
         <p:spPr/>
         <p:txBody>
           <a:bodyPr/>
-          <a:lstStyle>
-            <a:extLst/>
-          </a:lstStyle>
+          <a:lstStyle/>
           <a:p>
             <a:fld id="{D01D3B16-9DD8-4C37-8DF4-243418B31B2B}" type="slidenum">
               <a:rPr lang="lt-LT" smtClean="0"/>
@@ -2975,7 +2883,7 @@
 </file>
 
 <file path=ppt/slideLayouts/slideLayout9.xml><?xml version="1.0" encoding="utf-8"?>
-<p:sldLayout xmlns:a="http://schemas.openxmlformats.org/drawingml/2006/main" xmlns:r="http://schemas.openxmlformats.org/officeDocument/2006/relationships" xmlns:p="http://schemas.openxmlformats.org/presentationml/2006/main" showMasterSp="0" type="picTx" preserve="1">
+<p:sldLayout xmlns:a="http://schemas.openxmlformats.org/drawingml/2006/main" xmlns:r="http://schemas.openxmlformats.org/officeDocument/2006/relationships" xmlns:mc="http://schemas.openxmlformats.org/markup-compatibility/2006" xmlns:mv="urn:schemas-microsoft-com:mac:vml" xmlns:p="http://schemas.openxmlformats.org/presentationml/2006/main" mc:Ignorable="mv" mc:PreserveAttributes="mv:*" showMasterSp="0" type="picTx" preserve="1">
   <p:cSld name="Picture with Caption">
     <p:bg>
       <p:bgRef idx="1002">
@@ -3032,7 +2940,6 @@
             <a:lvl5pPr>
               <a:defRPr sz="900"/>
             </a:lvl5pPr>
-            <a:extLst/>
           </a:lstStyle>
           <a:p>
             <a:pPr lvl="0" eaLnBrk="1" latinLnBrk="0" hangingPunct="1"/>
@@ -3082,7 +2989,6 @@
               <a:buNone/>
               <a:defRPr sz="3200"/>
             </a:lvl1pPr>
-            <a:extLst/>
           </a:lstStyle>
           <a:p>
             <a:r>
@@ -3114,13 +3020,12 @@
                 </a:solidFill>
               </a:defRPr>
             </a:lvl1pPr>
-            <a:extLst/>
           </a:lstStyle>
           <a:p>
             <a:fld id="{8900D071-D45E-4DB1-8026-6607FD7943F8}" type="datetimeFigureOut">
               <a:rPr lang="lt-LT" smtClean="0"/>
               <a:pPr/>
-              <a:t>2009.01.22</a:t>
+              <a:t>1/22/09</a:t>
             </a:fld>
             <a:endParaRPr lang="lt-LT"/>
           </a:p>
@@ -3152,7 +3057,6 @@
                 </a:solidFill>
               </a:defRPr>
             </a:lvl1pPr>
-            <a:extLst/>
           </a:lstStyle>
           <a:p>
             <a:endParaRPr lang="lt-LT"/>
@@ -3180,7 +3084,6 @@
                 </a:solidFill>
               </a:defRPr>
             </a:lvl1pPr>
-            <a:extLst/>
           </a:lstStyle>
           <a:p>
             <a:fld id="{D01D3B16-9DD8-4C37-8DF4-243418B31B2B}" type="slidenum">
@@ -3229,7 +3132,6 @@
                 </a:effectLst>
               </a:defRPr>
             </a:lvl1pPr>
-            <a:extLst/>
           </a:lstStyle>
           <a:p>
             <a:r>
@@ -3316,9 +3218,7 @@
         </p:spPr>
         <p:txBody>
           <a:bodyPr vert="horz" wrap="square" lIns="91440" tIns="45720" rIns="91440" bIns="45720" anchor="t" compatLnSpc="1"/>
-          <a:lstStyle>
-            <a:extLst/>
-          </a:lstStyle>
+          <a:lstStyle/>
           <a:p>
             <a:endParaRPr kumimoji="0" lang="en-US" dirty="0"/>
           </a:p>
@@ -3398,9 +3298,7 @@
         </p:spPr>
         <p:txBody>
           <a:bodyPr vert="horz" wrap="square" lIns="91440" tIns="45720" rIns="91440" bIns="45720" anchor="t" compatLnSpc="1"/>
-          <a:lstStyle>
-            <a:extLst/>
-          </a:lstStyle>
+          <a:lstStyle/>
           <a:p>
             <a:endParaRPr kumimoji="0" lang="en-US" dirty="0"/>
           </a:p>
@@ -3508,9 +3406,7 @@
         </p:style>
         <p:txBody>
           <a:bodyPr vert="horz" wrap="square" lIns="91440" tIns="45720" rIns="91440" bIns="45720" anchor="ctr" compatLnSpc="1"/>
-          <a:lstStyle>
-            <a:extLst/>
-          </a:lstStyle>
+          <a:lstStyle/>
           <a:p>
             <a:pPr algn="ctr" eaLnBrk="1" latinLnBrk="0" hangingPunct="1"/>
             <a:endParaRPr kumimoji="0" lang="en-US" dirty="0"/>
@@ -3641,9 +3537,7 @@
         </p:style>
         <p:txBody>
           <a:bodyPr anchor="ctr"/>
-          <a:lstStyle>
-            <a:extLst/>
-          </a:lstStyle>
+          <a:lstStyle/>
           <a:p>
             <a:pPr algn="l" eaLnBrk="1" latinLnBrk="0" hangingPunct="1"/>
             <a:endParaRPr kumimoji="0" lang="en-US" dirty="0"/>
@@ -3721,9 +3615,7 @@
         </p:style>
         <p:txBody>
           <a:bodyPr anchor="ctr"/>
-          <a:lstStyle>
-            <a:extLst/>
-          </a:lstStyle>
+          <a:lstStyle/>
           <a:p>
             <a:pPr algn="l" eaLnBrk="1" latinLnBrk="0" hangingPunct="1"/>
             <a:endParaRPr kumimoji="0" lang="en-US" dirty="0"/>
@@ -3739,7 +3631,7 @@
 </file>
 
 <file path=ppt/slideMasters/slideMaster1.xml><?xml version="1.0" encoding="utf-8"?>
-<p:sldMaster xmlns:a="http://schemas.openxmlformats.org/drawingml/2006/main" xmlns:r="http://schemas.openxmlformats.org/officeDocument/2006/relationships" xmlns:p="http://schemas.openxmlformats.org/presentationml/2006/main">
+<p:sldMaster xmlns:a="http://schemas.openxmlformats.org/drawingml/2006/main" xmlns:r="http://schemas.openxmlformats.org/officeDocument/2006/relationships" xmlns:mc="http://schemas.openxmlformats.org/markup-compatibility/2006" xmlns:mv="urn:schemas-microsoft-com:mac:vml" xmlns:p="http://schemas.openxmlformats.org/presentationml/2006/main" mc:Ignorable="mv" mc:PreserveAttributes="mv:*">
   <p:cSld>
     <p:bg>
       <p:bgRef idx="1001">
@@ -3836,9 +3728,7 @@
         </p:spPr>
         <p:txBody>
           <a:bodyPr vert="horz" wrap="square" lIns="91440" tIns="45720" rIns="91440" bIns="45720" anchor="t" compatLnSpc="1"/>
-          <a:lstStyle>
-            <a:extLst/>
-          </a:lstStyle>
+          <a:lstStyle/>
           <a:p>
             <a:endParaRPr kumimoji="0" lang="en-US" dirty="0"/>
           </a:p>
@@ -3918,9 +3808,7 @@
         </p:spPr>
         <p:txBody>
           <a:bodyPr vert="horz" wrap="square" lIns="91440" tIns="45720" rIns="91440" bIns="45720" anchor="t" compatLnSpc="1"/>
-          <a:lstStyle>
-            <a:extLst/>
-          </a:lstStyle>
+          <a:lstStyle/>
           <a:p>
             <a:endParaRPr kumimoji="0" lang="en-US" dirty="0"/>
           </a:p>
@@ -4028,9 +3916,7 @@
         </p:style>
         <p:txBody>
           <a:bodyPr vert="horz" wrap="square" lIns="91440" tIns="45720" rIns="91440" bIns="45720" anchor="ctr" compatLnSpc="1"/>
-          <a:lstStyle>
-            <a:extLst/>
-          </a:lstStyle>
+          <a:lstStyle/>
           <a:p>
             <a:pPr algn="ctr" eaLnBrk="1" latinLnBrk="0" hangingPunct="1"/>
             <a:endParaRPr kumimoji="0" lang="en-US" dirty="0"/>
@@ -4120,9 +4006,7 @@
               <a:bevelT w="25400" h="25400"/>
             </a:sp3d>
           </a:bodyPr>
-          <a:lstStyle>
-            <a:extLst/>
-          </a:lstStyle>
+          <a:lstStyle/>
           <a:p>
             <a:r>
               <a:rPr kumimoji="0" lang="en-US" smtClean="0"/>
@@ -4155,9 +4039,7 @@
           <a:bodyPr vert="horz">
             <a:normAutofit/>
           </a:bodyPr>
-          <a:lstStyle>
-            <a:extLst/>
-          </a:lstStyle>
+          <a:lstStyle/>
           <a:p>
             <a:pPr lvl="0" eaLnBrk="1" latinLnBrk="0" hangingPunct="1"/>
             <a:r>
@@ -4225,13 +4107,12 @@
                 </a:solidFill>
               </a:defRPr>
             </a:lvl1pPr>
-            <a:extLst/>
           </a:lstStyle>
           <a:p>
             <a:fld id="{8900D071-D45E-4DB1-8026-6607FD7943F8}" type="datetimeFigureOut">
               <a:rPr lang="lt-LT" smtClean="0"/>
               <a:pPr/>
-              <a:t>2009.01.22</a:t>
+              <a:t>1/22/09</a:t>
             </a:fld>
             <a:endParaRPr lang="lt-LT"/>
           </a:p>
@@ -4266,7 +4147,6 @@
                 </a:solidFill>
               </a:defRPr>
             </a:lvl1pPr>
-            <a:extLst/>
           </a:lstStyle>
           <a:p>
             <a:endParaRPr lang="lt-LT"/>
@@ -4302,7 +4182,6 @@
                 </a:solidFill>
               </a:defRPr>
             </a:lvl1pPr>
-            <a:extLst/>
           </a:lstStyle>
           <a:p>
             <a:fld id="{D01D3B16-9DD8-4C37-8DF4-243418B31B2B}" type="slidenum">
@@ -4353,7 +4232,6 @@
           <a:cs typeface="+mj-cs"/>
         </a:defRPr>
       </a:lvl1pPr>
-      <a:extLst/>
     </p:titleStyle>
     <p:bodyStyle>
       <a:lvl1pPr marL="365760" indent="-256032" algn="l" rtl="0" eaLnBrk="1" latinLnBrk="0" hangingPunct="1">
@@ -4523,7 +4401,6 @@
           <a:cs typeface="+mn-cs"/>
         </a:defRPr>
       </a:lvl9pPr>
-      <a:extLst/>
     </p:bodyStyle>
     <p:otherStyle>
       <a:lvl1pPr marL="0" algn="l" rtl="0" eaLnBrk="1" latinLnBrk="0" hangingPunct="1">
@@ -4616,14 +4493,13 @@
           <a:cs typeface="+mn-cs"/>
         </a:defRPr>
       </a:lvl9pPr>
-      <a:extLst/>
     </p:otherStyle>
   </p:txStyles>
 </p:sldMaster>
 </file>
 
 <file path=ppt/slides/slide1.xml><?xml version="1.0" encoding="utf-8"?>
-<p:sld xmlns:a="http://schemas.openxmlformats.org/drawingml/2006/main" xmlns:r="http://schemas.openxmlformats.org/officeDocument/2006/relationships" xmlns:p="http://schemas.openxmlformats.org/presentationml/2006/main">
+<p:sld xmlns:a="http://schemas.openxmlformats.org/drawingml/2006/main" xmlns:r="http://schemas.openxmlformats.org/officeDocument/2006/relationships" xmlns:mc="http://schemas.openxmlformats.org/markup-compatibility/2006" xmlns:mv="urn:schemas-microsoft-com:mac:vml" xmlns:p="http://schemas.openxmlformats.org/presentationml/2006/main" mc:Ignorable="mv" mc:PreserveAttributes="mv:*">
   <p:cSld>
     <p:spTree>
       <p:nvGrpSpPr>
@@ -4720,7 +4596,7 @@
 </file>
 
 <file path=ppt/slides/slide10.xml><?xml version="1.0" encoding="utf-8"?>
-<p:sld xmlns:a="http://schemas.openxmlformats.org/drawingml/2006/main" xmlns:r="http://schemas.openxmlformats.org/officeDocument/2006/relationships" xmlns:p="http://schemas.openxmlformats.org/presentationml/2006/main" showMasterSp="0" show="0">
+<p:sld xmlns:a="http://schemas.openxmlformats.org/drawingml/2006/main" xmlns:r="http://schemas.openxmlformats.org/officeDocument/2006/relationships" xmlns:mc="http://schemas.openxmlformats.org/markup-compatibility/2006" xmlns:mv="urn:schemas-microsoft-com:mac:vml" xmlns:p="http://schemas.openxmlformats.org/presentationml/2006/main" mc:Ignorable="mv" mc:PreserveAttributes="mv:*" showMasterSp="0" show="0">
   <p:cSld>
     <p:spTree>
       <p:nvGrpSpPr>
@@ -4818,7 +4694,7 @@
 </file>
 
 <file path=ppt/slides/slide11.xml><?xml version="1.0" encoding="utf-8"?>
-<p:sld xmlns:a="http://schemas.openxmlformats.org/drawingml/2006/main" xmlns:r="http://schemas.openxmlformats.org/officeDocument/2006/relationships" xmlns:p="http://schemas.openxmlformats.org/presentationml/2006/main" show="0">
+<p:sld xmlns:a="http://schemas.openxmlformats.org/drawingml/2006/main" xmlns:r="http://schemas.openxmlformats.org/officeDocument/2006/relationships" xmlns:mc="http://schemas.openxmlformats.org/markup-compatibility/2006" xmlns:mv="urn:schemas-microsoft-com:mac:vml" xmlns:p="http://schemas.openxmlformats.org/presentationml/2006/main" mc:Ignorable="mv" mc:PreserveAttributes="mv:*" show="0">
   <p:cSld>
     <p:spTree>
       <p:nvGrpSpPr>
@@ -4919,7 +4795,7 @@
 </file>
 
 <file path=ppt/slides/slide12.xml><?xml version="1.0" encoding="utf-8"?>
-<p:sld xmlns:a="http://schemas.openxmlformats.org/drawingml/2006/main" xmlns:r="http://schemas.openxmlformats.org/officeDocument/2006/relationships" xmlns:p="http://schemas.openxmlformats.org/presentationml/2006/main">
+<p:sld xmlns:a="http://schemas.openxmlformats.org/drawingml/2006/main" xmlns:r="http://schemas.openxmlformats.org/officeDocument/2006/relationships" xmlns:mc="http://schemas.openxmlformats.org/markup-compatibility/2006" xmlns:mv="urn:schemas-microsoft-com:mac:vml" xmlns:p="http://schemas.openxmlformats.org/presentationml/2006/main" mc:Ignorable="mv" mc:PreserveAttributes="mv:*">
   <p:cSld>
     <p:spTree>
       <p:nvGrpSpPr>
@@ -5048,11 +4924,18 @@
   <p:clrMapOvr>
     <a:masterClrMapping/>
   </p:clrMapOvr>
+  <p:timing>
+    <p:tnLst>
+      <p:par>
+        <p:cTn id="1" dur="indefinite" restart="never" nodeType="tmRoot"/>
+      </p:par>
+    </p:tnLst>
+  </p:timing>
 </p:sld>
 </file>
 
 <file path=ppt/slides/slide13.xml><?xml version="1.0" encoding="utf-8"?>
-<p:sld xmlns:a="http://schemas.openxmlformats.org/drawingml/2006/main" xmlns:r="http://schemas.openxmlformats.org/officeDocument/2006/relationships" xmlns:p="http://schemas.openxmlformats.org/presentationml/2006/main">
+<p:sld xmlns:a="http://schemas.openxmlformats.org/drawingml/2006/main" xmlns:r="http://schemas.openxmlformats.org/officeDocument/2006/relationships" xmlns:mc="http://schemas.openxmlformats.org/markup-compatibility/2006" xmlns:mv="urn:schemas-microsoft-com:mac:vml" xmlns:p="http://schemas.openxmlformats.org/presentationml/2006/main" mc:Ignorable="mv" mc:PreserveAttributes="mv:*">
   <p:cSld>
     <p:spTree>
       <p:nvGrpSpPr>
@@ -5159,11 +5042,18 @@
   <p:clrMapOvr>
     <a:masterClrMapping/>
   </p:clrMapOvr>
+  <p:timing>
+    <p:tnLst>
+      <p:par>
+        <p:cTn id="1" dur="indefinite" restart="never" nodeType="tmRoot"/>
+      </p:par>
+    </p:tnLst>
+  </p:timing>
 </p:sld>
 </file>
 
 <file path=ppt/slides/slide14.xml><?xml version="1.0" encoding="utf-8"?>
-<p:sld xmlns:a="http://schemas.openxmlformats.org/drawingml/2006/main" xmlns:r="http://schemas.openxmlformats.org/officeDocument/2006/relationships" xmlns:p="http://schemas.openxmlformats.org/presentationml/2006/main">
+<p:sld xmlns:a="http://schemas.openxmlformats.org/drawingml/2006/main" xmlns:r="http://schemas.openxmlformats.org/officeDocument/2006/relationships" xmlns:mc="http://schemas.openxmlformats.org/markup-compatibility/2006" xmlns:mv="urn:schemas-microsoft-com:mac:vml" xmlns:p="http://schemas.openxmlformats.org/presentationml/2006/main" mc:Ignorable="mv" mc:PreserveAttributes="mv:*">
   <p:cSld>
     <p:spTree>
       <p:nvGrpSpPr>
@@ -5194,7 +5084,20 @@
           <a:bodyPr/>
           <a:lstStyle/>
           <a:p>
-            <a:endParaRPr lang="lt-LT"/>
+            <a:r>
+              <a:rPr lang="lt-LT" dirty="0" smtClean="0"/>
+              <a:t>Replace three separate (Z, Y, X) rotations with a single rotation.</a:t>
+            </a:r>
+          </a:p>
+          <a:p>
+            <a:r>
+              <a:rPr lang="lt-LT" dirty="0" smtClean="0"/>
+              <a:t>Solve the gimbal lock problem.</a:t>
+            </a:r>
+            <a:endParaRPr lang="lt-LT" dirty="0" smtClean="0"/>
+          </a:p>
+          <a:p>
+            <a:endParaRPr lang="lt-LT" dirty="0"/>
           </a:p>
         </p:txBody>
       </p:sp>
@@ -5226,11 +5129,1626 @@
   <p:clrMapOvr>
     <a:masterClrMapping/>
   </p:clrMapOvr>
+  <p:timing>
+    <p:tnLst>
+      <p:par>
+        <p:cTn id="1" dur="indefinite" restart="never" nodeType="tmRoot"/>
+      </p:par>
+    </p:tnLst>
+  </p:timing>
 </p:sld>
 </file>
 
 <file path=ppt/slides/slide15.xml><?xml version="1.0" encoding="utf-8"?>
-<p:sld xmlns:a="http://schemas.openxmlformats.org/drawingml/2006/main" xmlns:r="http://schemas.openxmlformats.org/officeDocument/2006/relationships" xmlns:p="http://schemas.openxmlformats.org/presentationml/2006/main">
+<p:sld xmlns:a="http://schemas.openxmlformats.org/drawingml/2006/main" xmlns:r="http://schemas.openxmlformats.org/officeDocument/2006/relationships" xmlns:mc="http://schemas.openxmlformats.org/markup-compatibility/2006" xmlns:mv="urn:schemas-microsoft-com:mac:vml" xmlns:p="http://schemas.openxmlformats.org/presentationml/2006/main" mc:Ignorable="mv" mc:PreserveAttributes="mv:*">
+  <p:cSld>
+    <p:spTree>
+      <p:nvGrpSpPr>
+        <p:cNvPr id="1" name=""/>
+        <p:cNvGrpSpPr/>
+        <p:nvPr/>
+      </p:nvGrpSpPr>
+      <p:grpSpPr>
+        <a:xfrm>
+          <a:off x="0" y="0"/>
+          <a:ext cx="0" cy="0"/>
+          <a:chOff x="0" y="0"/>
+          <a:chExt cx="0" cy="0"/>
+        </a:xfrm>
+      </p:grpSpPr>
+      <p:sp>
+        <p:nvSpPr>
+          <p:cNvPr id="2" name="Content Placeholder 1"/>
+          <p:cNvSpPr>
+            <a:spLocks noGrp="1"/>
+          </p:cNvSpPr>
+          <p:nvPr>
+            <p:ph idx="1"/>
+          </p:nvPr>
+        </p:nvSpPr>
+        <p:spPr/>
+        <p:txBody>
+          <a:bodyPr/>
+          <a:lstStyle/>
+          <a:p>
+            <a:r>
+              <a:rPr lang="en-US" dirty="0" smtClean="0"/>
+              <a:t>Four scalars.</a:t>
+            </a:r>
+          </a:p>
+          <a:p>
+            <a:pPr>
+              <a:buNone/>
+            </a:pPr>
+            <a:endParaRPr lang="en-US" dirty="0" smtClean="0"/>
+          </a:p>
+          <a:p>
+            <a:pPr>
+              <a:buNone/>
+            </a:pPr>
+            <a:r>
+              <a:rPr lang="en-US" dirty="0" smtClean="0"/>
+              <a:t>	</a:t>
+            </a:r>
+            <a:r>
+              <a:rPr lang="en-US" dirty="0" err="1" smtClean="0"/>
+              <a:t>q</a:t>
+            </a:r>
+            <a:r>
+              <a:rPr lang="en-US" dirty="0" smtClean="0"/>
+              <a:t> = a + </a:t>
+            </a:r>
+            <a:r>
+              <a:rPr lang="en-US" dirty="0" err="1" smtClean="0"/>
+              <a:t>i</a:t>
+            </a:r>
+            <a:r>
+              <a:rPr lang="en-US" dirty="0" smtClean="0"/>
+              <a:t> * </a:t>
+            </a:r>
+            <a:r>
+              <a:rPr lang="en-US" dirty="0" err="1" smtClean="0"/>
+              <a:t>b</a:t>
+            </a:r>
+            <a:r>
+              <a:rPr lang="en-US" dirty="0" smtClean="0"/>
+              <a:t> + </a:t>
+            </a:r>
+            <a:r>
+              <a:rPr lang="en-US" dirty="0" err="1" smtClean="0"/>
+              <a:t>j</a:t>
+            </a:r>
+            <a:r>
+              <a:rPr lang="en-US" dirty="0" smtClean="0"/>
+              <a:t> * </a:t>
+            </a:r>
+            <a:r>
+              <a:rPr lang="en-US" dirty="0" err="1" smtClean="0"/>
+              <a:t>c</a:t>
+            </a:r>
+            <a:r>
+              <a:rPr lang="en-US" dirty="0" smtClean="0"/>
+              <a:t> + </a:t>
+            </a:r>
+            <a:r>
+              <a:rPr lang="en-US" dirty="0" err="1" smtClean="0"/>
+              <a:t>k</a:t>
+            </a:r>
+            <a:r>
+              <a:rPr lang="en-US" dirty="0" smtClean="0"/>
+              <a:t> * </a:t>
+            </a:r>
+            <a:r>
+              <a:rPr lang="en-US" dirty="0" err="1" smtClean="0"/>
+              <a:t>d</a:t>
+            </a:r>
+            <a:endParaRPr lang="en-US" dirty="0" smtClean="0"/>
+          </a:p>
+          <a:p>
+            <a:pPr>
+              <a:buNone/>
+            </a:pPr>
+            <a:r>
+              <a:rPr lang="en-US" dirty="0" smtClean="0"/>
+              <a:t>	</a:t>
+            </a:r>
+          </a:p>
+          <a:p>
+            <a:pPr>
+              <a:buNone/>
+            </a:pPr>
+            <a:r>
+              <a:rPr lang="en-US" dirty="0" smtClean="0"/>
+              <a:t>	</a:t>
+            </a:r>
+            <a:r>
+              <a:rPr lang="en-US" dirty="0" smtClean="0"/>
+              <a:t>a – real dimension</a:t>
+            </a:r>
+          </a:p>
+          <a:p>
+            <a:pPr>
+              <a:buNone/>
+            </a:pPr>
+            <a:r>
+              <a:rPr lang="en-US" dirty="0" smtClean="0"/>
+              <a:t>	</a:t>
+            </a:r>
+            <a:r>
+              <a:rPr lang="en-US" dirty="0" err="1" smtClean="0"/>
+              <a:t>i</a:t>
+            </a:r>
+            <a:r>
+              <a:rPr lang="en-US" dirty="0" smtClean="0"/>
+              <a:t> * </a:t>
+            </a:r>
+            <a:r>
+              <a:rPr lang="en-US" dirty="0" err="1" smtClean="0"/>
+              <a:t>b</a:t>
+            </a:r>
+            <a:r>
+              <a:rPr lang="en-US" dirty="0" smtClean="0"/>
+              <a:t>, </a:t>
+            </a:r>
+            <a:r>
+              <a:rPr lang="en-US" dirty="0" err="1" smtClean="0"/>
+              <a:t>j</a:t>
+            </a:r>
+            <a:r>
+              <a:rPr lang="en-US" dirty="0" smtClean="0"/>
+              <a:t> * </a:t>
+            </a:r>
+            <a:r>
+              <a:rPr lang="en-US" dirty="0" err="1" smtClean="0"/>
+              <a:t>c</a:t>
+            </a:r>
+            <a:r>
+              <a:rPr lang="en-US" dirty="0" smtClean="0"/>
+              <a:t>, </a:t>
+            </a:r>
+            <a:r>
+              <a:rPr lang="en-US" dirty="0" err="1" smtClean="0"/>
+              <a:t>k</a:t>
+            </a:r>
+            <a:r>
+              <a:rPr lang="en-US" dirty="0" smtClean="0"/>
+              <a:t> * </a:t>
+            </a:r>
+            <a:r>
+              <a:rPr lang="en-US" dirty="0" err="1" smtClean="0"/>
+              <a:t>d</a:t>
+            </a:r>
+            <a:r>
+              <a:rPr lang="en-US" dirty="0" smtClean="0"/>
+              <a:t> – imaginary dimensions   </a:t>
+            </a:r>
+            <a:endParaRPr lang="en-US" dirty="0"/>
+          </a:p>
+        </p:txBody>
+      </p:sp>
+      <p:sp>
+        <p:nvSpPr>
+          <p:cNvPr id="3" name="Title 2"/>
+          <p:cNvSpPr>
+            <a:spLocks noGrp="1"/>
+          </p:cNvSpPr>
+          <p:nvPr>
+            <p:ph type="title"/>
+          </p:nvPr>
+        </p:nvSpPr>
+        <p:spPr/>
+        <p:txBody>
+          <a:bodyPr>
+            <a:normAutofit fontScale="90000"/>
+          </a:bodyPr>
+          <a:lstStyle/>
+          <a:p>
+            <a:r>
+              <a:rPr lang="en-US" dirty="0" err="1" smtClean="0"/>
+              <a:t>Quaternions</a:t>
+            </a:r>
+            <a:r>
+              <a:rPr lang="en-US" dirty="0" smtClean="0"/>
+              <a:t>. What is quaternion?</a:t>
+            </a:r>
+            <a:endParaRPr lang="en-US" dirty="0"/>
+          </a:p>
+        </p:txBody>
+      </p:sp>
+      <p:pic>
+        <p:nvPicPr>
+          <p:cNvPr id="4" name="Picture 3" descr="coordi3a.jpg"/>
+          <p:cNvPicPr>
+            <a:picLocks noChangeAspect="1"/>
+          </p:cNvPicPr>
+          <p:nvPr/>
+        </p:nvPicPr>
+        <p:blipFill>
+          <a:blip r:embed="rId2"/>
+          <a:stretch>
+            <a:fillRect/>
+          </a:stretch>
+        </p:blipFill>
+        <p:spPr>
+          <a:xfrm>
+            <a:off x="6172200" y="4343400"/>
+            <a:ext cx="2562225" cy="2247900"/>
+          </a:xfrm>
+          <a:prstGeom prst="rect">
+            <a:avLst/>
+          </a:prstGeom>
+        </p:spPr>
+      </p:pic>
+    </p:spTree>
+  </p:cSld>
+  <p:clrMapOvr>
+    <a:masterClrMapping/>
+  </p:clrMapOvr>
+  <p:timing>
+    <p:tnLst>
+      <p:par>
+        <p:cTn id="1" dur="indefinite" restart="never" nodeType="tmRoot"/>
+      </p:par>
+    </p:tnLst>
+  </p:timing>
+</p:sld>
+</file>
+
+<file path=ppt/slides/slide16.xml><?xml version="1.0" encoding="utf-8"?>
+<p:sld xmlns:a="http://schemas.openxmlformats.org/drawingml/2006/main" xmlns:r="http://schemas.openxmlformats.org/officeDocument/2006/relationships" xmlns:mc="http://schemas.openxmlformats.org/markup-compatibility/2006" xmlns:mv="urn:schemas-microsoft-com:mac:vml" xmlns:p="http://schemas.openxmlformats.org/presentationml/2006/main" mc:Ignorable="mv" mc:PreserveAttributes="mv:*">
+  <p:cSld>
+    <p:spTree>
+      <p:nvGrpSpPr>
+        <p:cNvPr id="1" name=""/>
+        <p:cNvGrpSpPr/>
+        <p:nvPr/>
+      </p:nvGrpSpPr>
+      <p:grpSpPr>
+        <a:xfrm>
+          <a:off x="0" y="0"/>
+          <a:ext cx="0" cy="0"/>
+          <a:chOff x="0" y="0"/>
+          <a:chExt cx="0" cy="0"/>
+        </a:xfrm>
+      </p:grpSpPr>
+      <p:sp>
+        <p:nvSpPr>
+          <p:cNvPr id="2" name="Content Placeholder 1"/>
+          <p:cNvSpPr>
+            <a:spLocks noGrp="1"/>
+          </p:cNvSpPr>
+          <p:nvPr>
+            <p:ph idx="1"/>
+          </p:nvPr>
+        </p:nvSpPr>
+        <p:spPr/>
+        <p:txBody>
+          <a:bodyPr/>
+          <a:lstStyle/>
+          <a:p>
+            <a:pPr>
+              <a:buFont typeface="Arial"/>
+              <a:buChar char="•"/>
+            </a:pPr>
+            <a:r>
+              <a:rPr lang="en-US" sz="1800" dirty="0" err="1" smtClean="0"/>
+              <a:t>i</a:t>
+            </a:r>
+            <a:r>
+              <a:rPr lang="en-US" sz="1800" dirty="0" smtClean="0"/>
+              <a:t> * </a:t>
+            </a:r>
+            <a:r>
+              <a:rPr lang="en-US" sz="1800" dirty="0" err="1" smtClean="0"/>
+              <a:t>i</a:t>
+            </a:r>
+            <a:r>
+              <a:rPr lang="en-US" sz="1800" dirty="0" smtClean="0"/>
+              <a:t> = </a:t>
+            </a:r>
+            <a:r>
+              <a:rPr lang="en-US" sz="1800" dirty="0" err="1" smtClean="0"/>
+              <a:t>j</a:t>
+            </a:r>
+            <a:r>
+              <a:rPr lang="en-US" sz="1800" dirty="0" smtClean="0"/>
+              <a:t> * </a:t>
+            </a:r>
+            <a:r>
+              <a:rPr lang="en-US" sz="1800" dirty="0" err="1" smtClean="0"/>
+              <a:t>j</a:t>
+            </a:r>
+            <a:r>
+              <a:rPr lang="en-US" sz="1800" dirty="0" smtClean="0"/>
+              <a:t> = </a:t>
+            </a:r>
+            <a:r>
+              <a:rPr lang="en-US" sz="1800" dirty="0" err="1" smtClean="0"/>
+              <a:t>k</a:t>
+            </a:r>
+            <a:r>
+              <a:rPr lang="en-US" sz="1800" dirty="0" smtClean="0"/>
+              <a:t> * </a:t>
+            </a:r>
+            <a:r>
+              <a:rPr lang="en-US" sz="1800" dirty="0" err="1" smtClean="0"/>
+              <a:t>k</a:t>
+            </a:r>
+            <a:r>
+              <a:rPr lang="en-US" sz="1800" dirty="0" smtClean="0"/>
+              <a:t> = -1</a:t>
+            </a:r>
+          </a:p>
+          <a:p>
+            <a:pPr>
+              <a:buFont typeface="Arial"/>
+              <a:buChar char="•"/>
+            </a:pPr>
+            <a:r>
+              <a:rPr lang="en-US" sz="1800" dirty="0" err="1" smtClean="0"/>
+              <a:t>i</a:t>
+            </a:r>
+            <a:r>
+              <a:rPr lang="en-US" sz="1800" dirty="0" smtClean="0"/>
+              <a:t> * </a:t>
+            </a:r>
+            <a:r>
+              <a:rPr lang="en-US" sz="1800" dirty="0" err="1" smtClean="0"/>
+              <a:t>j</a:t>
+            </a:r>
+            <a:r>
+              <a:rPr lang="en-US" sz="1800" dirty="0" smtClean="0"/>
+              <a:t> = </a:t>
+            </a:r>
+            <a:r>
+              <a:rPr lang="en-US" sz="1800" dirty="0" err="1" smtClean="0"/>
+              <a:t>k</a:t>
+            </a:r>
+            <a:endParaRPr lang="en-US" sz="1800" dirty="0" smtClean="0"/>
+          </a:p>
+          <a:p>
+            <a:pPr>
+              <a:buFont typeface="Arial"/>
+              <a:buChar char="•"/>
+            </a:pPr>
+            <a:r>
+              <a:rPr lang="en-US" sz="1800" dirty="0" err="1" smtClean="0"/>
+              <a:t>j</a:t>
+            </a:r>
+            <a:r>
+              <a:rPr lang="en-US" sz="1800" dirty="0" smtClean="0"/>
+              <a:t> * </a:t>
+            </a:r>
+            <a:r>
+              <a:rPr lang="en-US" sz="1800" dirty="0" err="1" smtClean="0"/>
+              <a:t>i</a:t>
+            </a:r>
+            <a:r>
+              <a:rPr lang="en-US" sz="1800" dirty="0" smtClean="0"/>
+              <a:t> = -</a:t>
+            </a:r>
+            <a:r>
+              <a:rPr lang="en-US" sz="1800" dirty="0" err="1" smtClean="0"/>
+              <a:t>k</a:t>
+            </a:r>
+            <a:endParaRPr lang="en-US" sz="1800" dirty="0" smtClean="0"/>
+          </a:p>
+          <a:p>
+            <a:pPr>
+              <a:buFont typeface="Arial"/>
+              <a:buChar char="•"/>
+            </a:pPr>
+            <a:r>
+              <a:rPr lang="en-US" sz="1800" dirty="0" err="1" smtClean="0"/>
+              <a:t>j</a:t>
+            </a:r>
+            <a:r>
+              <a:rPr lang="en-US" sz="1800" dirty="0" smtClean="0"/>
+              <a:t> * </a:t>
+            </a:r>
+            <a:r>
+              <a:rPr lang="en-US" sz="1800" dirty="0" err="1" smtClean="0"/>
+              <a:t>k</a:t>
+            </a:r>
+            <a:r>
+              <a:rPr lang="en-US" sz="1800" dirty="0" smtClean="0"/>
+              <a:t> = </a:t>
+            </a:r>
+            <a:r>
+              <a:rPr lang="en-US" sz="1800" dirty="0" err="1" smtClean="0"/>
+              <a:t>i</a:t>
+            </a:r>
+            <a:endParaRPr lang="en-US" sz="1800" dirty="0" smtClean="0"/>
+          </a:p>
+          <a:p>
+            <a:pPr>
+              <a:buFont typeface="Arial"/>
+              <a:buChar char="•"/>
+            </a:pPr>
+            <a:r>
+              <a:rPr lang="en-US" sz="1800" dirty="0" err="1" smtClean="0"/>
+              <a:t>k</a:t>
+            </a:r>
+            <a:r>
+              <a:rPr lang="en-US" sz="1800" dirty="0" smtClean="0"/>
+              <a:t> * </a:t>
+            </a:r>
+            <a:r>
+              <a:rPr lang="en-US" sz="1800" dirty="0" err="1" smtClean="0"/>
+              <a:t>j</a:t>
+            </a:r>
+            <a:r>
+              <a:rPr lang="en-US" sz="1800" dirty="0" smtClean="0"/>
+              <a:t> = -</a:t>
+            </a:r>
+            <a:r>
+              <a:rPr lang="en-US" sz="1800" dirty="0" err="1" smtClean="0"/>
+              <a:t>i</a:t>
+            </a:r>
+            <a:endParaRPr lang="en-US" sz="1800" dirty="0" smtClean="0"/>
+          </a:p>
+          <a:p>
+            <a:pPr>
+              <a:buFont typeface="Arial"/>
+              <a:buChar char="•"/>
+            </a:pPr>
+            <a:r>
+              <a:rPr lang="en-US" sz="1800" dirty="0" err="1" smtClean="0"/>
+              <a:t>k</a:t>
+            </a:r>
+            <a:r>
+              <a:rPr lang="en-US" sz="1800" dirty="0" smtClean="0"/>
+              <a:t> * </a:t>
+            </a:r>
+            <a:r>
+              <a:rPr lang="en-US" sz="1800" dirty="0" err="1" smtClean="0"/>
+              <a:t>i</a:t>
+            </a:r>
+            <a:r>
+              <a:rPr lang="en-US" sz="1800" dirty="0" smtClean="0"/>
+              <a:t> = </a:t>
+            </a:r>
+            <a:r>
+              <a:rPr lang="en-US" sz="1800" dirty="0" err="1" smtClean="0"/>
+              <a:t>j</a:t>
+            </a:r>
+            <a:endParaRPr lang="en-US" sz="1800" dirty="0" smtClean="0"/>
+          </a:p>
+          <a:p>
+            <a:pPr>
+              <a:buFont typeface="Arial"/>
+              <a:buChar char="•"/>
+            </a:pPr>
+            <a:r>
+              <a:rPr lang="en-US" sz="1800" dirty="0" err="1" smtClean="0"/>
+              <a:t>i</a:t>
+            </a:r>
+            <a:r>
+              <a:rPr lang="en-US" sz="1800" dirty="0" smtClean="0"/>
+              <a:t> * </a:t>
+            </a:r>
+            <a:r>
+              <a:rPr lang="en-US" sz="1800" dirty="0" err="1" smtClean="0"/>
+              <a:t>k</a:t>
+            </a:r>
+            <a:r>
+              <a:rPr lang="en-US" sz="1800" dirty="0" smtClean="0"/>
+              <a:t> = </a:t>
+            </a:r>
+            <a:r>
+              <a:rPr lang="en-US" sz="1800" dirty="0" err="1" smtClean="0"/>
+              <a:t>j</a:t>
+            </a:r>
+            <a:endParaRPr lang="en-US" sz="1800" dirty="0" smtClean="0"/>
+          </a:p>
+          <a:p>
+            <a:pPr>
+              <a:buFont typeface="Arial"/>
+              <a:buChar char="•"/>
+            </a:pPr>
+            <a:endParaRPr lang="en-US" sz="1800" dirty="0" smtClean="0"/>
+          </a:p>
+          <a:p>
+            <a:pPr>
+              <a:buNone/>
+            </a:pPr>
+            <a:endParaRPr lang="en-US" sz="1800" dirty="0" smtClean="0"/>
+          </a:p>
+          <a:p>
+            <a:pPr>
+              <a:buNone/>
+            </a:pPr>
+            <a:r>
+              <a:rPr lang="en-US" sz="1400" dirty="0" smtClean="0"/>
+              <a:t>(a + </a:t>
+            </a:r>
+            <a:r>
+              <a:rPr lang="en-US" sz="1400" dirty="0" err="1" smtClean="0"/>
+              <a:t>i∗</a:t>
+            </a:r>
+            <a:r>
+              <a:rPr lang="en-US" sz="1400" dirty="0" err="1" smtClean="0"/>
+              <a:t>b</a:t>
+            </a:r>
+            <a:r>
+              <a:rPr lang="en-US" sz="1400" dirty="0" smtClean="0"/>
+              <a:t> + </a:t>
+            </a:r>
+            <a:r>
+              <a:rPr lang="en-US" sz="1400" dirty="0" err="1" smtClean="0"/>
+              <a:t>j∗c</a:t>
+            </a:r>
+            <a:r>
+              <a:rPr lang="en-US" sz="1400" dirty="0" smtClean="0"/>
+              <a:t> + </a:t>
+            </a:r>
+            <a:r>
+              <a:rPr lang="en-US" sz="1400" dirty="0" err="1" smtClean="0"/>
+              <a:t>k∗d</a:t>
+            </a:r>
+            <a:r>
+              <a:rPr lang="en-US" sz="1400" dirty="0" smtClean="0"/>
+              <a:t>) ∗ (</a:t>
+            </a:r>
+            <a:r>
+              <a:rPr lang="en-US" sz="1400" dirty="0" err="1" smtClean="0"/>
+              <a:t>e</a:t>
+            </a:r>
+            <a:r>
+              <a:rPr lang="en-US" sz="1400" dirty="0" smtClean="0"/>
+              <a:t> + </a:t>
+            </a:r>
+            <a:r>
+              <a:rPr lang="en-US" sz="1400" dirty="0" err="1" smtClean="0"/>
+              <a:t>i∗f</a:t>
+            </a:r>
+            <a:r>
+              <a:rPr lang="en-US" sz="1400" dirty="0" smtClean="0"/>
+              <a:t> + </a:t>
+            </a:r>
+            <a:r>
+              <a:rPr lang="en-US" sz="1400" dirty="0" err="1" smtClean="0"/>
+              <a:t>j∗g</a:t>
+            </a:r>
+            <a:r>
+              <a:rPr lang="en-US" sz="1400" dirty="0" smtClean="0"/>
+              <a:t> + </a:t>
+            </a:r>
+            <a:r>
+              <a:rPr lang="en-US" sz="1400" dirty="0" err="1" smtClean="0"/>
+              <a:t>k∗h</a:t>
+            </a:r>
+            <a:r>
+              <a:rPr lang="en-US" sz="1400" dirty="0" smtClean="0"/>
+              <a:t>)</a:t>
+            </a:r>
+            <a:r>
+              <a:rPr lang="en-US" sz="1400" dirty="0" smtClean="0"/>
+              <a:t> = </a:t>
+            </a:r>
+          </a:p>
+          <a:p>
+            <a:pPr>
+              <a:buNone/>
+            </a:pPr>
+            <a:r>
+              <a:rPr lang="en-US" sz="1400" dirty="0" smtClean="0"/>
+              <a:t>(</a:t>
+            </a:r>
+            <a:r>
+              <a:rPr lang="en-US" sz="1400" dirty="0" smtClean="0"/>
+              <a:t>a ∗</a:t>
+            </a:r>
+            <a:r>
+              <a:rPr lang="en-US" sz="1400" dirty="0" err="1" smtClean="0"/>
+              <a:t>e</a:t>
+            </a:r>
+            <a:r>
+              <a:rPr lang="en-US" sz="1400" dirty="0" smtClean="0"/>
+              <a:t> - </a:t>
+            </a:r>
+            <a:r>
+              <a:rPr lang="en-US" sz="1400" dirty="0" err="1" smtClean="0"/>
+              <a:t>b∗f</a:t>
+            </a:r>
+            <a:r>
+              <a:rPr lang="en-US" sz="1400" dirty="0" smtClean="0"/>
+              <a:t> - </a:t>
+            </a:r>
+            <a:r>
+              <a:rPr lang="en-US" sz="1400" dirty="0" err="1" smtClean="0"/>
+              <a:t>c∗g</a:t>
+            </a:r>
+            <a:r>
+              <a:rPr lang="en-US" sz="1400" dirty="0" smtClean="0"/>
+              <a:t> - </a:t>
+            </a:r>
+            <a:r>
+              <a:rPr lang="en-US" sz="1400" dirty="0" err="1" smtClean="0"/>
+              <a:t>d∗h</a:t>
+            </a:r>
+            <a:r>
+              <a:rPr lang="en-US" sz="1400" dirty="0" smtClean="0"/>
+              <a:t>) + </a:t>
+            </a:r>
+            <a:r>
+              <a:rPr lang="en-US" sz="1400" dirty="0" err="1" smtClean="0"/>
+              <a:t>i∗(a∗f</a:t>
+            </a:r>
+            <a:r>
+              <a:rPr lang="en-US" sz="1400" dirty="0" smtClean="0"/>
+              <a:t> + </a:t>
+            </a:r>
+            <a:r>
+              <a:rPr lang="en-US" sz="1400" dirty="0" err="1" smtClean="0"/>
+              <a:t>b∗e</a:t>
+            </a:r>
+            <a:r>
+              <a:rPr lang="en-US" sz="1400" dirty="0" smtClean="0"/>
+              <a:t> + </a:t>
+            </a:r>
+            <a:r>
+              <a:rPr lang="en-US" sz="1400" dirty="0" err="1" smtClean="0"/>
+              <a:t>c∗h</a:t>
+            </a:r>
+            <a:r>
+              <a:rPr lang="en-US" sz="1400" dirty="0" smtClean="0"/>
+              <a:t> - </a:t>
+            </a:r>
+            <a:r>
+              <a:rPr lang="en-US" sz="1400" dirty="0" err="1" smtClean="0"/>
+              <a:t>d∗g</a:t>
+            </a:r>
+            <a:r>
+              <a:rPr lang="en-US" sz="1400" dirty="0" smtClean="0"/>
+              <a:t>) + </a:t>
+            </a:r>
+            <a:r>
+              <a:rPr lang="en-US" sz="1400" dirty="0" err="1" smtClean="0"/>
+              <a:t>j∗(a∗</a:t>
+            </a:r>
+            <a:r>
+              <a:rPr lang="en-US" sz="1400" dirty="0" err="1" smtClean="0"/>
+              <a:t>g</a:t>
+            </a:r>
+            <a:r>
+              <a:rPr lang="en-US" sz="1400" dirty="0" smtClean="0"/>
+              <a:t>- </a:t>
+            </a:r>
+            <a:r>
+              <a:rPr lang="en-US" sz="1400" dirty="0" err="1" smtClean="0"/>
+              <a:t>b</a:t>
+            </a:r>
+            <a:r>
+              <a:rPr lang="en-US" sz="1400" dirty="0" smtClean="0"/>
+              <a:t> ∗</a:t>
+            </a:r>
+            <a:r>
+              <a:rPr lang="en-US" sz="1400" dirty="0" err="1" smtClean="0"/>
+              <a:t>h</a:t>
+            </a:r>
+            <a:r>
+              <a:rPr lang="en-US" sz="1400" dirty="0" smtClean="0"/>
+              <a:t> + </a:t>
+            </a:r>
+            <a:r>
+              <a:rPr lang="en-US" sz="1400" dirty="0" err="1" smtClean="0"/>
+              <a:t>e∗c</a:t>
+            </a:r>
+            <a:r>
+              <a:rPr lang="en-US" sz="1400" dirty="0" smtClean="0"/>
+              <a:t> + </a:t>
+            </a:r>
+            <a:r>
+              <a:rPr lang="en-US" sz="1400" dirty="0" err="1" smtClean="0"/>
+              <a:t>d∗f</a:t>
+            </a:r>
+            <a:r>
+              <a:rPr lang="en-US" sz="1400" dirty="0" smtClean="0"/>
+              <a:t>)</a:t>
+            </a:r>
+            <a:r>
+              <a:rPr lang="en-US" sz="1400" dirty="0" smtClean="0"/>
+              <a:t> + </a:t>
+            </a:r>
+            <a:r>
+              <a:rPr lang="en-US" sz="1400" dirty="0" err="1" smtClean="0"/>
+              <a:t>k∗(a∗h</a:t>
+            </a:r>
+            <a:r>
+              <a:rPr lang="en-US" sz="1400" dirty="0" smtClean="0"/>
+              <a:t> + </a:t>
+            </a:r>
+            <a:r>
+              <a:rPr lang="en-US" sz="1400" dirty="0" err="1" smtClean="0"/>
+              <a:t>b∗g</a:t>
+            </a:r>
+            <a:r>
+              <a:rPr lang="en-US" sz="1400" dirty="0" smtClean="0"/>
+              <a:t> - </a:t>
+            </a:r>
+            <a:r>
+              <a:rPr lang="en-US" sz="1400" dirty="0" err="1" smtClean="0"/>
+              <a:t>c∗</a:t>
+            </a:r>
+            <a:r>
+              <a:rPr lang="en-US" sz="1400" dirty="0" err="1" smtClean="0"/>
+              <a:t>f</a:t>
+            </a:r>
+            <a:r>
+              <a:rPr lang="en-US" sz="1400" dirty="0" smtClean="0"/>
+              <a:t> + </a:t>
+            </a:r>
+            <a:r>
+              <a:rPr lang="en-US" sz="1400" dirty="0" err="1" smtClean="0"/>
+              <a:t>e</a:t>
+            </a:r>
+            <a:r>
+              <a:rPr lang="en-US" sz="1400" dirty="0" err="1" smtClean="0"/>
+              <a:t>∗</a:t>
+            </a:r>
+            <a:r>
+              <a:rPr lang="en-US" sz="1400" dirty="0" err="1" smtClean="0"/>
+              <a:t>d</a:t>
+            </a:r>
+            <a:r>
+              <a:rPr lang="en-US" sz="1400" dirty="0" smtClean="0"/>
+              <a:t>)</a:t>
+            </a:r>
+          </a:p>
+          <a:p>
+            <a:pPr>
+              <a:buFont typeface="Arial"/>
+              <a:buChar char="•"/>
+            </a:pPr>
+            <a:endParaRPr lang="en-US" dirty="0" smtClean="0"/>
+          </a:p>
+        </p:txBody>
+      </p:sp>
+      <p:sp>
+        <p:nvSpPr>
+          <p:cNvPr id="3" name="Title 2"/>
+          <p:cNvSpPr>
+            <a:spLocks noGrp="1"/>
+          </p:cNvSpPr>
+          <p:nvPr>
+            <p:ph type="title"/>
+          </p:nvPr>
+        </p:nvSpPr>
+        <p:spPr/>
+        <p:txBody>
+          <a:bodyPr>
+            <a:normAutofit/>
+          </a:bodyPr>
+          <a:lstStyle/>
+          <a:p>
+            <a:r>
+              <a:rPr lang="en-US" sz="3200" dirty="0" err="1" smtClean="0"/>
+              <a:t>Quaternions</a:t>
+            </a:r>
+            <a:r>
+              <a:rPr lang="en-US" sz="3200" dirty="0" smtClean="0"/>
+              <a:t>. Algebra (multiplication)</a:t>
+            </a:r>
+            <a:endParaRPr lang="en-US" sz="3200" dirty="0"/>
+          </a:p>
+        </p:txBody>
+      </p:sp>
+      <p:pic>
+        <p:nvPicPr>
+          <p:cNvPr id="5" name="Picture 4" descr="coordi3a.jpg"/>
+          <p:cNvPicPr>
+            <a:picLocks noChangeAspect="1"/>
+          </p:cNvPicPr>
+          <p:nvPr/>
+        </p:nvPicPr>
+        <p:blipFill>
+          <a:blip r:embed="rId2"/>
+          <a:stretch>
+            <a:fillRect/>
+          </a:stretch>
+        </p:blipFill>
+        <p:spPr>
+          <a:xfrm>
+            <a:off x="6019800" y="1371600"/>
+            <a:ext cx="2562225" cy="2247900"/>
+          </a:xfrm>
+          <a:prstGeom prst="rect">
+            <a:avLst/>
+          </a:prstGeom>
+        </p:spPr>
+      </p:pic>
+    </p:spTree>
+  </p:cSld>
+  <p:clrMapOvr>
+    <a:masterClrMapping/>
+  </p:clrMapOvr>
+  <p:timing>
+    <p:tnLst>
+      <p:par>
+        <p:cTn id="1" dur="indefinite" restart="never" nodeType="tmRoot"/>
+      </p:par>
+    </p:tnLst>
+  </p:timing>
+</p:sld>
+</file>
+
+<file path=ppt/slides/slide17.xml><?xml version="1.0" encoding="utf-8"?>
+<p:sld xmlns:a="http://schemas.openxmlformats.org/drawingml/2006/main" xmlns:r="http://schemas.openxmlformats.org/officeDocument/2006/relationships" xmlns:mc="http://schemas.openxmlformats.org/markup-compatibility/2006" xmlns:mv="urn:schemas-microsoft-com:mac:vml" xmlns:p="http://schemas.openxmlformats.org/presentationml/2006/main" mc:Ignorable="mv" mc:PreserveAttributes="mv:*">
+  <p:cSld>
+    <p:spTree>
+      <p:nvGrpSpPr>
+        <p:cNvPr id="1" name=""/>
+        <p:cNvGrpSpPr/>
+        <p:nvPr/>
+      </p:nvGrpSpPr>
+      <p:grpSpPr>
+        <a:xfrm>
+          <a:off x="0" y="0"/>
+          <a:ext cx="0" cy="0"/>
+          <a:chOff x="0" y="0"/>
+          <a:chExt cx="0" cy="0"/>
+        </a:xfrm>
+      </p:grpSpPr>
+      <p:sp>
+        <p:nvSpPr>
+          <p:cNvPr id="2" name="Content Placeholder 1"/>
+          <p:cNvSpPr>
+            <a:spLocks noGrp="1"/>
+          </p:cNvSpPr>
+          <p:nvPr>
+            <p:ph idx="1"/>
+          </p:nvPr>
+        </p:nvSpPr>
+        <p:spPr/>
+        <p:txBody>
+          <a:bodyPr/>
+          <a:lstStyle/>
+          <a:p>
+            <a:r>
+              <a:rPr lang="en-US" dirty="0" smtClean="0"/>
+              <a:t>Quaternion multiplication represents a rotation.</a:t>
+            </a:r>
+          </a:p>
+          <a:p>
+            <a:pPr lvl="1"/>
+            <a:r>
+              <a:rPr lang="en-US" dirty="0" smtClean="0"/>
+              <a:t>q1 – representation of rotation around X axis</a:t>
+            </a:r>
+          </a:p>
+          <a:p>
+            <a:pPr lvl="1"/>
+            <a:r>
+              <a:rPr lang="en-US" dirty="0" smtClean="0"/>
+              <a:t>q2 – representation of rotation around Y axis</a:t>
+            </a:r>
+          </a:p>
+          <a:p>
+            <a:pPr lvl="1"/>
+            <a:r>
+              <a:rPr lang="en-US" dirty="0" smtClean="0"/>
+              <a:t>q</a:t>
+            </a:r>
+            <a:r>
+              <a:rPr lang="en-US" dirty="0" smtClean="0"/>
+              <a:t>3 – representation of rotation around Z axis</a:t>
+            </a:r>
+          </a:p>
+          <a:p>
+            <a:pPr lvl="1"/>
+            <a:r>
+              <a:rPr lang="en-US" dirty="0" err="1" smtClean="0"/>
+              <a:t>q</a:t>
+            </a:r>
+            <a:r>
+              <a:rPr lang="en-US" dirty="0" smtClean="0"/>
+              <a:t> = q1 * q2 * q3 – representation of rotation around Z Y X axes. </a:t>
+            </a:r>
+            <a:endParaRPr lang="en-US" dirty="0"/>
+          </a:p>
+        </p:txBody>
+      </p:sp>
+      <p:sp>
+        <p:nvSpPr>
+          <p:cNvPr id="3" name="Title 2"/>
+          <p:cNvSpPr>
+            <a:spLocks noGrp="1"/>
+          </p:cNvSpPr>
+          <p:nvPr>
+            <p:ph type="title"/>
+          </p:nvPr>
+        </p:nvSpPr>
+        <p:spPr/>
+        <p:txBody>
+          <a:bodyPr/>
+          <a:lstStyle/>
+          <a:p>
+            <a:r>
+              <a:rPr lang="en-US" dirty="0" err="1" smtClean="0"/>
+              <a:t>Quaternions</a:t>
+            </a:r>
+            <a:r>
+              <a:rPr lang="en-US" dirty="0" smtClean="0"/>
+              <a:t>. Rotation</a:t>
+            </a:r>
+            <a:endParaRPr lang="en-US" dirty="0"/>
+          </a:p>
+        </p:txBody>
+      </p:sp>
+    </p:spTree>
+  </p:cSld>
+  <p:clrMapOvr>
+    <a:masterClrMapping/>
+  </p:clrMapOvr>
+  <p:timing>
+    <p:tnLst>
+      <p:par>
+        <p:cTn id="1" dur="indefinite" restart="never" nodeType="tmRoot"/>
+      </p:par>
+    </p:tnLst>
+  </p:timing>
+</p:sld>
+</file>
+
+<file path=ppt/slides/slide18.xml><?xml version="1.0" encoding="utf-8"?>
+<p:sld xmlns:a="http://schemas.openxmlformats.org/drawingml/2006/main" xmlns:r="http://schemas.openxmlformats.org/officeDocument/2006/relationships" xmlns:mc="http://schemas.openxmlformats.org/markup-compatibility/2006" xmlns:mv="urn:schemas-microsoft-com:mac:vml" xmlns:p="http://schemas.openxmlformats.org/presentationml/2006/main" mc:Ignorable="mv" mc:PreserveAttributes="mv:*">
+  <p:cSld>
+    <p:spTree>
+      <p:nvGrpSpPr>
+        <p:cNvPr id="1" name=""/>
+        <p:cNvGrpSpPr/>
+        <p:nvPr/>
+      </p:nvGrpSpPr>
+      <p:grpSpPr>
+        <a:xfrm>
+          <a:off x="0" y="0"/>
+          <a:ext cx="0" cy="0"/>
+          <a:chOff x="0" y="0"/>
+          <a:chExt cx="0" cy="0"/>
+        </a:xfrm>
+      </p:grpSpPr>
+      <p:sp>
+        <p:nvSpPr>
+          <p:cNvPr id="2" name="Content Placeholder 1"/>
+          <p:cNvSpPr>
+            <a:spLocks noGrp="1"/>
+          </p:cNvSpPr>
+          <p:nvPr>
+            <p:ph idx="1"/>
+          </p:nvPr>
+        </p:nvSpPr>
+        <p:spPr/>
+        <p:txBody>
+          <a:bodyPr/>
+          <a:lstStyle/>
+          <a:p>
+            <a:r>
+              <a:rPr lang="en-US" dirty="0" err="1" smtClean="0"/>
+              <a:t>q</a:t>
+            </a:r>
+            <a:r>
+              <a:rPr lang="en-US" dirty="0" smtClean="0"/>
+              <a:t> = a + </a:t>
+            </a:r>
+            <a:r>
+              <a:rPr lang="en-US" dirty="0" err="1" smtClean="0"/>
+              <a:t>i</a:t>
+            </a:r>
+            <a:r>
+              <a:rPr lang="en-US" dirty="0" smtClean="0"/>
+              <a:t> * </a:t>
+            </a:r>
+            <a:r>
+              <a:rPr lang="en-US" dirty="0" err="1" smtClean="0"/>
+              <a:t>b</a:t>
+            </a:r>
+            <a:r>
+              <a:rPr lang="en-US" dirty="0" smtClean="0"/>
+              <a:t> + </a:t>
+            </a:r>
+            <a:r>
+              <a:rPr lang="en-US" dirty="0" err="1" smtClean="0"/>
+              <a:t>j</a:t>
+            </a:r>
+            <a:r>
+              <a:rPr lang="en-US" dirty="0" smtClean="0"/>
+              <a:t> * </a:t>
+            </a:r>
+            <a:r>
+              <a:rPr lang="en-US" dirty="0" err="1" smtClean="0"/>
+              <a:t>c</a:t>
+            </a:r>
+            <a:r>
+              <a:rPr lang="en-US" dirty="0" smtClean="0"/>
+              <a:t> + </a:t>
+            </a:r>
+            <a:r>
+              <a:rPr lang="en-US" dirty="0" err="1" smtClean="0"/>
+              <a:t>k</a:t>
+            </a:r>
+            <a:r>
+              <a:rPr lang="en-US" dirty="0" smtClean="0"/>
+              <a:t> *</a:t>
+            </a:r>
+            <a:r>
+              <a:rPr lang="en-US" dirty="0" smtClean="0"/>
+              <a:t> </a:t>
+            </a:r>
+            <a:r>
+              <a:rPr lang="en-US" dirty="0" err="1" smtClean="0"/>
+              <a:t>d</a:t>
+            </a:r>
+            <a:endParaRPr lang="en-US" dirty="0" smtClean="0"/>
+          </a:p>
+          <a:p>
+            <a:pPr lvl="1"/>
+            <a:r>
+              <a:rPr lang="en-US" sz="1800" dirty="0" smtClean="0"/>
+              <a:t>a = </a:t>
+            </a:r>
+            <a:r>
+              <a:rPr lang="en-US" sz="1800" dirty="0" err="1" smtClean="0"/>
+              <a:t>cos</a:t>
+            </a:r>
+            <a:r>
+              <a:rPr lang="en-US" sz="1800" dirty="0" err="1" smtClean="0"/>
+              <a:t>(angle</a:t>
+            </a:r>
+            <a:r>
+              <a:rPr lang="en-US" sz="1800" dirty="0" smtClean="0"/>
+              <a:t> / 2)</a:t>
+            </a:r>
+          </a:p>
+          <a:p>
+            <a:pPr lvl="1"/>
+            <a:r>
+              <a:rPr lang="en-US" sz="1800" dirty="0" err="1" smtClean="0"/>
+              <a:t>b</a:t>
+            </a:r>
+            <a:r>
+              <a:rPr lang="en-US" sz="1800" dirty="0" smtClean="0"/>
+              <a:t> = </a:t>
+            </a:r>
+            <a:r>
+              <a:rPr lang="en-US" sz="1800" dirty="0" err="1" smtClean="0"/>
+              <a:t>axisX</a:t>
+            </a:r>
+            <a:r>
+              <a:rPr lang="en-US" sz="1800" dirty="0" smtClean="0"/>
+              <a:t> * </a:t>
+            </a:r>
+            <a:r>
+              <a:rPr lang="en-US" sz="1800" dirty="0" err="1" smtClean="0"/>
+              <a:t>sin(angle</a:t>
+            </a:r>
+            <a:r>
+              <a:rPr lang="en-US" sz="1800" dirty="0" smtClean="0"/>
+              <a:t> / 2)</a:t>
+            </a:r>
+          </a:p>
+          <a:p>
+            <a:pPr lvl="1"/>
+            <a:r>
+              <a:rPr lang="en-US" sz="1800" dirty="0" err="1" smtClean="0"/>
+              <a:t>c</a:t>
+            </a:r>
+            <a:r>
+              <a:rPr lang="en-US" sz="1800" dirty="0" smtClean="0"/>
+              <a:t> = </a:t>
+            </a:r>
+            <a:r>
+              <a:rPr lang="en-US" sz="1800" dirty="0" err="1" smtClean="0"/>
+              <a:t>axisY</a:t>
+            </a:r>
+            <a:r>
+              <a:rPr lang="en-US" sz="1800" dirty="0" smtClean="0"/>
+              <a:t> * </a:t>
+            </a:r>
+            <a:r>
+              <a:rPr lang="en-US" sz="1800" dirty="0" err="1" smtClean="0"/>
+              <a:t>sin(angle</a:t>
+            </a:r>
+            <a:r>
+              <a:rPr lang="en-US" sz="1800" dirty="0" smtClean="0"/>
+              <a:t> / 2)</a:t>
+            </a:r>
+          </a:p>
+          <a:p>
+            <a:pPr lvl="1"/>
+            <a:r>
+              <a:rPr lang="en-US" sz="1800" dirty="0" err="1" smtClean="0"/>
+              <a:t>d</a:t>
+            </a:r>
+            <a:r>
+              <a:rPr lang="en-US" sz="1800" dirty="0" smtClean="0"/>
+              <a:t> = </a:t>
+            </a:r>
+            <a:r>
+              <a:rPr lang="en-US" sz="1800" dirty="0" err="1" smtClean="0"/>
+              <a:t>axisZ</a:t>
+            </a:r>
+            <a:r>
+              <a:rPr lang="en-US" sz="1800" dirty="0" smtClean="0"/>
+              <a:t> * </a:t>
+            </a:r>
+            <a:r>
+              <a:rPr lang="en-US" sz="1800" dirty="0" err="1" smtClean="0"/>
+              <a:t>sin(angle</a:t>
+            </a:r>
+            <a:r>
+              <a:rPr lang="en-US" sz="1800" dirty="0" smtClean="0"/>
+              <a:t> / 2)</a:t>
+            </a:r>
+          </a:p>
+          <a:p>
+            <a:pPr lvl="1"/>
+            <a:endParaRPr lang="en-US" sz="1800" dirty="0" smtClean="0"/>
+          </a:p>
+          <a:p>
+            <a:pPr lvl="1"/>
+            <a:r>
+              <a:rPr lang="en-US" sz="1800" dirty="0" smtClean="0"/>
+              <a:t>a</a:t>
+            </a:r>
+            <a:r>
+              <a:rPr lang="en-US" sz="1800" dirty="0" smtClean="0"/>
+              <a:t>ngle = </a:t>
+            </a:r>
+            <a:r>
+              <a:rPr lang="en-US" sz="1800" dirty="0" err="1" smtClean="0"/>
+              <a:t>arccos(a</a:t>
+            </a:r>
+            <a:r>
+              <a:rPr lang="en-US" sz="1800" dirty="0" smtClean="0"/>
+              <a:t>) * 2</a:t>
+            </a:r>
+          </a:p>
+          <a:p>
+            <a:pPr lvl="1"/>
+            <a:r>
+              <a:rPr lang="en-US" sz="1800" dirty="0" err="1" smtClean="0"/>
+              <a:t>sinA</a:t>
+            </a:r>
+            <a:r>
+              <a:rPr lang="en-US" sz="1800" dirty="0" smtClean="0"/>
+              <a:t> = sqrt(1 – a*a)</a:t>
+            </a:r>
+          </a:p>
+          <a:p>
+            <a:pPr lvl="1"/>
+            <a:r>
+              <a:rPr lang="en-US" sz="1800" dirty="0" err="1" smtClean="0"/>
+              <a:t>vectorX</a:t>
+            </a:r>
+            <a:r>
+              <a:rPr lang="en-US" sz="1800" dirty="0" smtClean="0"/>
+              <a:t> = </a:t>
+            </a:r>
+            <a:r>
+              <a:rPr lang="en-US" sz="1800" dirty="0" err="1" smtClean="0"/>
+              <a:t>b/sinA</a:t>
+            </a:r>
+            <a:endParaRPr lang="en-US" sz="1800" dirty="0" smtClean="0"/>
+          </a:p>
+          <a:p>
+            <a:pPr lvl="1"/>
+            <a:r>
+              <a:rPr lang="en-US" sz="1800" dirty="0" err="1" smtClean="0"/>
+              <a:t>vectorY</a:t>
+            </a:r>
+            <a:r>
+              <a:rPr lang="en-US" sz="1800" dirty="0" smtClean="0"/>
+              <a:t> = </a:t>
+            </a:r>
+            <a:r>
+              <a:rPr lang="en-US" sz="1800" dirty="0" err="1" smtClean="0"/>
+              <a:t>c/sinA</a:t>
+            </a:r>
+            <a:endParaRPr lang="en-US" sz="1800" dirty="0" smtClean="0"/>
+          </a:p>
+          <a:p>
+            <a:pPr lvl="1"/>
+            <a:r>
+              <a:rPr lang="en-US" sz="1800" dirty="0" err="1" smtClean="0"/>
+              <a:t>vectorZ</a:t>
+            </a:r>
+            <a:r>
+              <a:rPr lang="en-US" sz="1800" dirty="0" smtClean="0"/>
+              <a:t> = </a:t>
+            </a:r>
+            <a:r>
+              <a:rPr lang="en-US" sz="1800" dirty="0" err="1" smtClean="0"/>
+              <a:t>d/sinA</a:t>
+            </a:r>
+            <a:endParaRPr lang="en-US" sz="1800" dirty="0" smtClean="0"/>
+          </a:p>
+        </p:txBody>
+      </p:sp>
+      <p:sp>
+        <p:nvSpPr>
+          <p:cNvPr id="3" name="Title 2"/>
+          <p:cNvSpPr>
+            <a:spLocks noGrp="1"/>
+          </p:cNvSpPr>
+          <p:nvPr>
+            <p:ph type="title"/>
+          </p:nvPr>
+        </p:nvSpPr>
+        <p:spPr/>
+        <p:txBody>
+          <a:bodyPr/>
+          <a:lstStyle/>
+          <a:p>
+            <a:r>
+              <a:rPr lang="en-US" dirty="0" err="1" smtClean="0"/>
+              <a:t>Quaternions</a:t>
+            </a:r>
+            <a:r>
+              <a:rPr lang="en-US" dirty="0" smtClean="0"/>
+              <a:t>. Last bits…</a:t>
+            </a:r>
+            <a:endParaRPr lang="en-US" dirty="0"/>
+          </a:p>
+        </p:txBody>
+      </p:sp>
+    </p:spTree>
+  </p:cSld>
+  <p:clrMapOvr>
+    <a:masterClrMapping/>
+  </p:clrMapOvr>
+  <p:timing>
+    <p:tnLst>
+      <p:par>
+        <p:cTn id="1" dur="indefinite" restart="never" nodeType="tmRoot"/>
+      </p:par>
+    </p:tnLst>
+  </p:timing>
+</p:sld>
+</file>
+
+<file path=ppt/slides/slide19.xml><?xml version="1.0" encoding="utf-8"?>
+<p:sld xmlns:a="http://schemas.openxmlformats.org/drawingml/2006/main" xmlns:r="http://schemas.openxmlformats.org/officeDocument/2006/relationships" xmlns:mc="http://schemas.openxmlformats.org/markup-compatibility/2006" xmlns:mv="urn:schemas-microsoft-com:mac:vml" xmlns:p="http://schemas.openxmlformats.org/presentationml/2006/main" mc:Ignorable="mv" mc:PreserveAttributes="mv:*">
+  <p:cSld>
+    <p:spTree>
+      <p:nvGrpSpPr>
+        <p:cNvPr id="1" name=""/>
+        <p:cNvGrpSpPr/>
+        <p:nvPr/>
+      </p:nvGrpSpPr>
+      <p:grpSpPr>
+        <a:xfrm>
+          <a:off x="0" y="0"/>
+          <a:ext cx="0" cy="0"/>
+          <a:chOff x="0" y="0"/>
+          <a:chExt cx="0" cy="0"/>
+        </a:xfrm>
+      </p:grpSpPr>
+      <p:sp>
+        <p:nvSpPr>
+          <p:cNvPr id="2" name="Content Placeholder 1"/>
+          <p:cNvSpPr>
+            <a:spLocks noGrp="1"/>
+          </p:cNvSpPr>
+          <p:nvPr>
+            <p:ph idx="1"/>
+          </p:nvPr>
+        </p:nvSpPr>
+        <p:spPr/>
+        <p:txBody>
+          <a:bodyPr/>
+          <a:lstStyle/>
+          <a:p>
+            <a:r>
+              <a:rPr lang="en-US" dirty="0" smtClean="0"/>
+              <a:t>Rotation ends up with unsuspected results</a:t>
+            </a:r>
+          </a:p>
+          <a:p>
+            <a:r>
+              <a:rPr lang="en-US" dirty="0" smtClean="0"/>
+              <a:t>Axes of rotations lock together</a:t>
+            </a:r>
+            <a:endParaRPr lang="en-US" dirty="0"/>
+          </a:p>
+        </p:txBody>
+      </p:sp>
+      <p:sp>
+        <p:nvSpPr>
+          <p:cNvPr id="3" name="Title 2"/>
+          <p:cNvSpPr>
+            <a:spLocks noGrp="1"/>
+          </p:cNvSpPr>
+          <p:nvPr>
+            <p:ph type="title"/>
+          </p:nvPr>
+        </p:nvSpPr>
+        <p:spPr/>
+        <p:txBody>
+          <a:bodyPr/>
+          <a:lstStyle/>
+          <a:p>
+            <a:r>
+              <a:rPr lang="en-US" dirty="0" err="1" smtClean="0"/>
+              <a:t>Gimbal</a:t>
+            </a:r>
+            <a:r>
+              <a:rPr lang="en-US" dirty="0" smtClean="0"/>
+              <a:t> lock</a:t>
+            </a:r>
+            <a:endParaRPr lang="en-US" dirty="0"/>
+          </a:p>
+        </p:txBody>
+      </p:sp>
+    </p:spTree>
+  </p:cSld>
+  <p:clrMapOvr>
+    <a:masterClrMapping/>
+  </p:clrMapOvr>
+  <p:timing>
+    <p:tnLst>
+      <p:par>
+        <p:cTn id="1" dur="indefinite" restart="never" nodeType="tmRoot"/>
+      </p:par>
+    </p:tnLst>
+  </p:timing>
+</p:sld>
+</file>
+
+<file path=ppt/slides/slide2.xml><?xml version="1.0" encoding="utf-8"?>
+<p:sld xmlns:a="http://schemas.openxmlformats.org/drawingml/2006/main" xmlns:r="http://schemas.openxmlformats.org/officeDocument/2006/relationships" xmlns:mc="http://schemas.openxmlformats.org/markup-compatibility/2006" xmlns:mv="urn:schemas-microsoft-com:mac:vml" xmlns:p="http://schemas.openxmlformats.org/presentationml/2006/main" mc:Ignorable="mv" mc:PreserveAttributes="mv:*">
+  <p:cSld>
+    <p:spTree>
+      <p:nvGrpSpPr>
+        <p:cNvPr id="1" name=""/>
+        <p:cNvGrpSpPr/>
+        <p:nvPr/>
+      </p:nvGrpSpPr>
+      <p:grpSpPr>
+        <a:xfrm>
+          <a:off x="0" y="0"/>
+          <a:ext cx="0" cy="0"/>
+          <a:chOff x="0" y="0"/>
+          <a:chExt cx="0" cy="0"/>
+        </a:xfrm>
+      </p:grpSpPr>
+      <p:sp>
+        <p:nvSpPr>
+          <p:cNvPr id="2" name="Content Placeholder 1"/>
+          <p:cNvSpPr>
+            <a:spLocks noGrp="1"/>
+          </p:cNvSpPr>
+          <p:nvPr>
+            <p:ph idx="1"/>
+          </p:nvPr>
+        </p:nvSpPr>
+        <p:spPr/>
+        <p:txBody>
+          <a:bodyPr/>
+          <a:lstStyle/>
+          <a:p>
+            <a:r>
+              <a:rPr lang="lt-LT" dirty="0" smtClean="0"/>
+              <a:t>Introduction</a:t>
+            </a:r>
+          </a:p>
+          <a:p>
+            <a:r>
+              <a:rPr lang="lt-LT" dirty="0" smtClean="0"/>
+              <a:t>Motion capture and motion data</a:t>
+            </a:r>
+          </a:p>
+          <a:p>
+            <a:r>
+              <a:rPr lang="lt-LT" dirty="0" smtClean="0"/>
+              <a:t>Used </a:t>
+            </a:r>
+            <a:r>
+              <a:rPr lang="en-US" dirty="0" smtClean="0"/>
+              <a:t>techniques</a:t>
+            </a:r>
+          </a:p>
+          <a:p>
+            <a:r>
+              <a:rPr lang="lt-LT" dirty="0" smtClean="0"/>
+              <a:t>Animating human body</a:t>
+            </a:r>
+          </a:p>
+          <a:p>
+            <a:r>
+              <a:rPr lang="lt-LT" dirty="0" smtClean="0"/>
+              <a:t>Problems</a:t>
+            </a:r>
+            <a:endParaRPr lang="en-US" dirty="0" smtClean="0"/>
+          </a:p>
+          <a:p>
+            <a:r>
+              <a:rPr lang="en-US" dirty="0" smtClean="0"/>
+              <a:t>Conclusion and possible future tasks</a:t>
+            </a:r>
+            <a:endParaRPr lang="lt-LT" dirty="0" smtClean="0"/>
+          </a:p>
+          <a:p>
+            <a:endParaRPr lang="lt-LT" dirty="0" smtClean="0"/>
+          </a:p>
+          <a:p>
+            <a:pPr lvl="1"/>
+            <a:endParaRPr lang="lt-LT" dirty="0" smtClean="0"/>
+          </a:p>
+          <a:p>
+            <a:endParaRPr lang="lt-LT" dirty="0"/>
+          </a:p>
+        </p:txBody>
+      </p:sp>
+      <p:sp>
+        <p:nvSpPr>
+          <p:cNvPr id="3" name="Title 2"/>
+          <p:cNvSpPr>
+            <a:spLocks noGrp="1"/>
+          </p:cNvSpPr>
+          <p:nvPr>
+            <p:ph type="title"/>
+          </p:nvPr>
+        </p:nvSpPr>
+        <p:spPr/>
+        <p:txBody>
+          <a:bodyPr/>
+          <a:lstStyle/>
+          <a:p>
+            <a:r>
+              <a:rPr lang="lt-LT" dirty="0" smtClean="0"/>
+              <a:t>Contents</a:t>
+            </a:r>
+            <a:endParaRPr lang="lt-LT" dirty="0"/>
+          </a:p>
+        </p:txBody>
+      </p:sp>
+    </p:spTree>
+  </p:cSld>
+  <p:clrMapOvr>
+    <a:masterClrMapping/>
+  </p:clrMapOvr>
+  <p:timing>
+    <p:tnLst>
+      <p:par>
+        <p:cTn id="1" dur="indefinite" restart="never" nodeType="tmRoot"/>
+      </p:par>
+    </p:tnLst>
+  </p:timing>
+</p:sld>
+</file>
+
+<file path=ppt/slides/slide20.xml><?xml version="1.0" encoding="utf-8"?>
+<p:sld xmlns:a="http://schemas.openxmlformats.org/drawingml/2006/main" xmlns:r="http://schemas.openxmlformats.org/officeDocument/2006/relationships" xmlns:mc="http://schemas.openxmlformats.org/markup-compatibility/2006" xmlns:mv="urn:schemas-microsoft-com:mac:vml" xmlns:p="http://schemas.openxmlformats.org/presentationml/2006/main" mc:Ignorable="mv" mc:PreserveAttributes="mv:*">
+  <p:cSld>
+    <p:spTree>
+      <p:nvGrpSpPr>
+        <p:cNvPr id="1" name=""/>
+        <p:cNvGrpSpPr/>
+        <p:nvPr/>
+      </p:nvGrpSpPr>
+      <p:grpSpPr>
+        <a:xfrm>
+          <a:off x="0" y="0"/>
+          <a:ext cx="0" cy="0"/>
+          <a:chOff x="0" y="0"/>
+          <a:chExt cx="0" cy="0"/>
+        </a:xfrm>
+      </p:grpSpPr>
+      <p:sp>
+        <p:nvSpPr>
+          <p:cNvPr id="2" name="Content Placeholder 1"/>
+          <p:cNvSpPr>
+            <a:spLocks noGrp="1"/>
+          </p:cNvSpPr>
+          <p:nvPr>
+            <p:ph idx="1"/>
+          </p:nvPr>
+        </p:nvSpPr>
+        <p:spPr/>
+        <p:txBody>
+          <a:bodyPr/>
+          <a:lstStyle/>
+          <a:p>
+            <a:pPr>
+              <a:buNone/>
+            </a:pPr>
+            <a:endParaRPr lang="en-US" dirty="0"/>
+          </a:p>
+        </p:txBody>
+      </p:sp>
+      <p:sp>
+        <p:nvSpPr>
+          <p:cNvPr id="3" name="Title 2"/>
+          <p:cNvSpPr>
+            <a:spLocks noGrp="1"/>
+          </p:cNvSpPr>
+          <p:nvPr>
+            <p:ph type="title"/>
+          </p:nvPr>
+        </p:nvSpPr>
+        <p:spPr/>
+        <p:txBody>
+          <a:bodyPr/>
+          <a:lstStyle/>
+          <a:p>
+            <a:r>
+              <a:rPr lang="en-US" dirty="0" err="1" smtClean="0"/>
+              <a:t>Gimbal</a:t>
+            </a:r>
+            <a:r>
+              <a:rPr lang="en-US" dirty="0" smtClean="0"/>
+              <a:t> lock. Explained Visually</a:t>
+            </a:r>
+            <a:endParaRPr lang="en-US" dirty="0"/>
+          </a:p>
+        </p:txBody>
+      </p:sp>
+      <p:pic>
+        <p:nvPicPr>
+          <p:cNvPr id="4" name="Picture 3" descr="Picture 1.png"/>
+          <p:cNvPicPr>
+            <a:picLocks noChangeAspect="1"/>
+          </p:cNvPicPr>
+          <p:nvPr/>
+        </p:nvPicPr>
+        <p:blipFill>
+          <a:blip r:embed="rId2"/>
+          <a:stretch>
+            <a:fillRect/>
+          </a:stretch>
+        </p:blipFill>
+        <p:spPr>
+          <a:xfrm>
+            <a:off x="990600" y="1600200"/>
+            <a:ext cx="3057040" cy="4114800"/>
+          </a:xfrm>
+          <a:prstGeom prst="rect">
+            <a:avLst/>
+          </a:prstGeom>
+        </p:spPr>
+      </p:pic>
+      <p:pic>
+        <p:nvPicPr>
+          <p:cNvPr id="6" name="Picture 5" descr="Picture 2.png"/>
+          <p:cNvPicPr>
+            <a:picLocks noChangeAspect="1"/>
+          </p:cNvPicPr>
+          <p:nvPr/>
+        </p:nvPicPr>
+        <p:blipFill>
+          <a:blip r:embed="rId3"/>
+          <a:stretch>
+            <a:fillRect/>
+          </a:stretch>
+        </p:blipFill>
+        <p:spPr>
+          <a:xfrm>
+            <a:off x="4724400" y="1600200"/>
+            <a:ext cx="3093721" cy="4267200"/>
+          </a:xfrm>
+          <a:prstGeom prst="rect">
+            <a:avLst/>
+          </a:prstGeom>
+        </p:spPr>
+      </p:pic>
+    </p:spTree>
+  </p:cSld>
+  <p:clrMapOvr>
+    <a:masterClrMapping/>
+  </p:clrMapOvr>
+  <p:timing>
+    <p:tnLst>
+      <p:par>
+        <p:cTn id="1" dur="indefinite" restart="never" nodeType="tmRoot"/>
+      </p:par>
+    </p:tnLst>
+  </p:timing>
+</p:sld>
+</file>
+
+<file path=ppt/slides/slide21.xml><?xml version="1.0" encoding="utf-8"?>
+<p:sld xmlns:a="http://schemas.openxmlformats.org/drawingml/2006/main" xmlns:r="http://schemas.openxmlformats.org/officeDocument/2006/relationships" xmlns:mc="http://schemas.openxmlformats.org/markup-compatibility/2006" xmlns:mv="urn:schemas-microsoft-com:mac:vml" xmlns:p="http://schemas.openxmlformats.org/presentationml/2006/main" mc:Ignorable="mv" mc:PreserveAttributes="mv:*">
   <p:cSld>
     <p:spTree>
       <p:nvGrpSpPr>
@@ -5342,11 +6860,18 @@
   <p:clrMapOvr>
     <a:masterClrMapping/>
   </p:clrMapOvr>
+  <p:timing>
+    <p:tnLst>
+      <p:par>
+        <p:cTn id="1" dur="indefinite" restart="never" nodeType="tmRoot"/>
+      </p:par>
+    </p:tnLst>
+  </p:timing>
 </p:sld>
 </file>
 
-<file path=ppt/slides/slide16.xml><?xml version="1.0" encoding="utf-8"?>
-<p:sld xmlns:a="http://schemas.openxmlformats.org/drawingml/2006/main" xmlns:r="http://schemas.openxmlformats.org/officeDocument/2006/relationships" xmlns:p="http://schemas.openxmlformats.org/presentationml/2006/main">
+<file path=ppt/slides/slide22.xml><?xml version="1.0" encoding="utf-8"?>
+<p:sld xmlns:a="http://schemas.openxmlformats.org/drawingml/2006/main" xmlns:r="http://schemas.openxmlformats.org/officeDocument/2006/relationships" xmlns:mc="http://schemas.openxmlformats.org/markup-compatibility/2006" xmlns:mv="urn:schemas-microsoft-com:mac:vml" xmlns:p="http://schemas.openxmlformats.org/presentationml/2006/main" mc:Ignorable="mv" mc:PreserveAttributes="mv:*">
   <p:cSld>
     <p:spTree>
       <p:nvGrpSpPr>
@@ -5393,19 +6918,11 @@
             <a:pPr lvl="1"/>
             <a:r>
               <a:rPr lang="lt-LT" i="1" dirty="0" smtClean="0"/>
-              <a:t>L(t</a:t>
-            </a:r>
-            <a:r>
-              <a:rPr lang="lt-LT" i="1" dirty="0" smtClean="0"/>
-              <a:t>)</a:t>
+              <a:t>L(t)</a:t>
             </a:r>
             <a:r>
               <a:rPr lang="lt-LT" dirty="0" smtClean="0"/>
-              <a:t> = A + </a:t>
-            </a:r>
-            <a:r>
-              <a:rPr lang="lt-LT" dirty="0" smtClean="0"/>
-              <a:t>b</a:t>
+              <a:t> = A + b</a:t>
             </a:r>
             <a:r>
               <a:rPr lang="en-US" dirty="0" smtClean="0"/>
@@ -5511,11 +7028,7 @@
           <a:p>
             <a:r>
               <a:rPr lang="en-US" dirty="0" smtClean="0"/>
-              <a:t>A and B could be taken as two points on two separate </a:t>
-            </a:r>
-            <a:r>
-              <a:rPr lang="en-US" dirty="0" smtClean="0"/>
-              <a:t>meshes.</a:t>
+              <a:t>A and B could be taken as two points on two separate meshes.</a:t>
             </a:r>
           </a:p>
           <a:p>
@@ -5535,11 +7048,18 @@
   <p:clrMapOvr>
     <a:masterClrMapping/>
   </p:clrMapOvr>
+  <p:timing>
+    <p:tnLst>
+      <p:par>
+        <p:cTn id="1" dur="indefinite" restart="never" nodeType="tmRoot"/>
+      </p:par>
+    </p:tnLst>
+  </p:timing>
 </p:sld>
 </file>
 
-<file path=ppt/slides/slide17.xml><?xml version="1.0" encoding="utf-8"?>
-<p:sld xmlns:a="http://schemas.openxmlformats.org/drawingml/2006/main" xmlns:r="http://schemas.openxmlformats.org/officeDocument/2006/relationships" xmlns:p="http://schemas.openxmlformats.org/presentationml/2006/main">
+<file path=ppt/slides/slide23.xml><?xml version="1.0" encoding="utf-8"?>
+<p:sld xmlns:a="http://schemas.openxmlformats.org/drawingml/2006/main" xmlns:r="http://schemas.openxmlformats.org/officeDocument/2006/relationships" xmlns:mc="http://schemas.openxmlformats.org/markup-compatibility/2006" xmlns:mv="urn:schemas-microsoft-com:mac:vml" xmlns:p="http://schemas.openxmlformats.org/presentationml/2006/main" mc:Ignorable="mv" mc:PreserveAttributes="mv:*">
   <p:cSld>
     <p:spTree>
       <p:nvGrpSpPr>
@@ -5570,7 +7090,27 @@
           <a:bodyPr/>
           <a:lstStyle/>
           <a:p>
-            <a:endParaRPr lang="lt-LT"/>
+            <a:r>
+              <a:rPr lang="lt-LT" dirty="0" smtClean="0"/>
+              <a:t>Technique, used to position body parts in 3D scene</a:t>
+            </a:r>
+          </a:p>
+          <a:p>
+            <a:pPr lvl="1"/>
+            <a:r>
+              <a:rPr lang="lt-LT" dirty="0" smtClean="0"/>
+              <a:t>Each joint has it’s local transformation</a:t>
+            </a:r>
+          </a:p>
+          <a:p>
+            <a:pPr lvl="1"/>
+            <a:r>
+              <a:rPr lang="lt-LT" dirty="0" smtClean="0"/>
+              <a:t>Global transformation of each joint depends on it’s parent transformation</a:t>
+            </a:r>
+          </a:p>
+          <a:p>
+            <a:endParaRPr lang="lt-LT" dirty="0"/>
           </a:p>
         </p:txBody>
       </p:sp>
@@ -5591,7 +7131,7 @@
           <a:p>
             <a:r>
               <a:rPr lang="en-US" dirty="0" smtClean="0"/>
-              <a:t>Inverse/Forward??? </a:t>
+              <a:t>Forward </a:t>
             </a:r>
             <a:r>
               <a:rPr lang="en-US" dirty="0" smtClean="0"/>
@@ -5606,11 +7146,18 @@
   <p:clrMapOvr>
     <a:masterClrMapping/>
   </p:clrMapOvr>
+  <p:timing>
+    <p:tnLst>
+      <p:par>
+        <p:cTn id="1" dur="indefinite" restart="never" nodeType="tmRoot"/>
+      </p:par>
+    </p:tnLst>
+  </p:timing>
 </p:sld>
 </file>
 
-<file path=ppt/slides/slide18.xml><?xml version="1.0" encoding="utf-8"?>
-<p:sld xmlns:a="http://schemas.openxmlformats.org/drawingml/2006/main" xmlns:r="http://schemas.openxmlformats.org/officeDocument/2006/relationships" xmlns:p="http://schemas.openxmlformats.org/presentationml/2006/main">
+<file path=ppt/slides/slide24.xml><?xml version="1.0" encoding="utf-8"?>
+<p:sld xmlns:a="http://schemas.openxmlformats.org/drawingml/2006/main" xmlns:r="http://schemas.openxmlformats.org/officeDocument/2006/relationships" xmlns:mc="http://schemas.openxmlformats.org/markup-compatibility/2006" xmlns:mv="urn:schemas-microsoft-com:mac:vml" xmlns:p="http://schemas.openxmlformats.org/presentationml/2006/main" mc:Ignorable="mv" mc:PreserveAttributes="mv:*">
   <p:cSld>
     <p:spTree>
       <p:nvGrpSpPr>
@@ -5641,6 +7188,84 @@
           <a:bodyPr/>
           <a:lstStyle/>
           <a:p>
+            <a:r>
+              <a:rPr lang="en-US" dirty="0" smtClean="0"/>
+              <a:t>From a mathematical point of view:</a:t>
+            </a:r>
+          </a:p>
+          <a:p>
+            <a:pPr lvl="1">
+              <a:buNone/>
+            </a:pPr>
+            <a:endParaRPr lang="en-US" dirty="0" smtClean="0"/>
+          </a:p>
+          <a:p>
+            <a:pPr lvl="1">
+              <a:buNone/>
+            </a:pPr>
+            <a:r>
+              <a:rPr lang="en-US" dirty="0" err="1" smtClean="0"/>
+              <a:t>M</a:t>
+            </a:r>
+            <a:r>
+              <a:rPr lang="en-US" baseline="30000" dirty="0" err="1" smtClean="0"/>
+              <a:t>n</a:t>
+            </a:r>
+            <a:r>
+              <a:rPr lang="en-US" baseline="-25000" dirty="0" err="1" smtClean="0"/>
+              <a:t>global</a:t>
+            </a:r>
+            <a:r>
+              <a:rPr lang="en-US" dirty="0" smtClean="0"/>
+              <a:t> = </a:t>
+            </a:r>
+            <a:r>
+              <a:rPr lang="en-US" dirty="0" err="1" smtClean="0"/>
+              <a:t>Π</a:t>
+            </a:r>
+            <a:r>
+              <a:rPr lang="en-US" baseline="30000" dirty="0" err="1" smtClean="0"/>
+              <a:t>n</a:t>
+            </a:r>
+            <a:r>
+              <a:rPr lang="en-US" baseline="-25000" dirty="0" err="1" smtClean="0"/>
+              <a:t>i</a:t>
+            </a:r>
+            <a:r>
+              <a:rPr lang="en-US" baseline="-25000" dirty="0" smtClean="0"/>
+              <a:t>=0</a:t>
+            </a:r>
+            <a:r>
+              <a:rPr lang="en-US" dirty="0" smtClean="0"/>
+              <a:t>M</a:t>
+            </a:r>
+            <a:r>
+              <a:rPr lang="en-US" baseline="30000" dirty="0" smtClean="0"/>
+              <a:t>i</a:t>
+            </a:r>
+            <a:r>
+              <a:rPr lang="en-US" baseline="-25000" dirty="0" smtClean="0"/>
+              <a:t>local</a:t>
+            </a:r>
+          </a:p>
+          <a:p>
+            <a:pPr lvl="1">
+              <a:buNone/>
+            </a:pPr>
+            <a:endParaRPr lang="en-US" baseline="-25000" dirty="0" smtClean="0"/>
+          </a:p>
+          <a:p>
+            <a:pPr lvl="1">
+              <a:buNone/>
+            </a:pPr>
+            <a:r>
+              <a:rPr lang="en-US" dirty="0" err="1" smtClean="0"/>
+              <a:t>n</a:t>
+            </a:r>
+            <a:r>
+              <a:rPr lang="en-US" dirty="0" smtClean="0"/>
+              <a:t> – current joint in the hierarchy</a:t>
+            </a:r>
             <a:endParaRPr lang="en-US" dirty="0"/>
           </a:p>
         </p:txBody>
@@ -5662,12 +7287,36 @@
           <a:p>
             <a:r>
               <a:rPr lang="en-US" dirty="0" smtClean="0"/>
-              <a:t>Animating human body</a:t>
+              <a:t>Forward kinematics. </a:t>
             </a:r>
             <a:endParaRPr lang="en-US" dirty="0"/>
           </a:p>
         </p:txBody>
       </p:sp>
+      <p:pic>
+        <p:nvPicPr>
+          <p:cNvPr id="4" name="Picture 3" descr="Picture 3.png"/>
+          <p:cNvPicPr>
+            <a:picLocks noChangeAspect="1"/>
+          </p:cNvPicPr>
+          <p:nvPr/>
+        </p:nvPicPr>
+        <p:blipFill>
+          <a:blip r:embed="rId2"/>
+          <a:stretch>
+            <a:fillRect/>
+          </a:stretch>
+        </p:blipFill>
+        <p:spPr>
+          <a:xfrm>
+            <a:off x="5562600" y="2057400"/>
+            <a:ext cx="3480340" cy="4267200"/>
+          </a:xfrm>
+          <a:prstGeom prst="rect">
+            <a:avLst/>
+          </a:prstGeom>
+        </p:spPr>
+      </p:pic>
     </p:spTree>
   </p:cSld>
   <p:clrMapOvr>
@@ -5676,8 +7325,8 @@
 </p:sld>
 </file>
 
-<file path=ppt/slides/slide19.xml><?xml version="1.0" encoding="utf-8"?>
-<p:sld xmlns:a="http://schemas.openxmlformats.org/drawingml/2006/main" xmlns:r="http://schemas.openxmlformats.org/officeDocument/2006/relationships" xmlns:p="http://schemas.openxmlformats.org/presentationml/2006/main">
+<file path=ppt/slides/slide25.xml><?xml version="1.0" encoding="utf-8"?>
+<p:sld xmlns:a="http://schemas.openxmlformats.org/drawingml/2006/main" xmlns:r="http://schemas.openxmlformats.org/officeDocument/2006/relationships" xmlns:mc="http://schemas.openxmlformats.org/markup-compatibility/2006" xmlns:mv="urn:schemas-microsoft-com:mac:vml" xmlns:p="http://schemas.openxmlformats.org/presentationml/2006/main" mc:Ignorable="mv" mc:PreserveAttributes="mv:*">
   <p:cSld>
     <p:spTree>
       <p:nvGrpSpPr>
@@ -5708,6 +7357,80 @@
           <a:bodyPr/>
           <a:lstStyle/>
           <a:p>
+            <a:endParaRPr lang="en-US" dirty="0"/>
+          </a:p>
+        </p:txBody>
+      </p:sp>
+      <p:sp>
+        <p:nvSpPr>
+          <p:cNvPr id="3" name="Title 2"/>
+          <p:cNvSpPr>
+            <a:spLocks noGrp="1"/>
+          </p:cNvSpPr>
+          <p:nvPr>
+            <p:ph type="title"/>
+          </p:nvPr>
+        </p:nvSpPr>
+        <p:spPr/>
+        <p:txBody>
+          <a:bodyPr/>
+          <a:lstStyle/>
+          <a:p>
+            <a:r>
+              <a:rPr lang="en-US" dirty="0" smtClean="0"/>
+              <a:t>Animating human body</a:t>
+            </a:r>
+            <a:endParaRPr lang="en-US" dirty="0"/>
+          </a:p>
+        </p:txBody>
+      </p:sp>
+    </p:spTree>
+  </p:cSld>
+  <p:clrMapOvr>
+    <a:masterClrMapping/>
+  </p:clrMapOvr>
+  <p:timing>
+    <p:tnLst>
+      <p:par>
+        <p:cTn id="1" dur="indefinite" restart="never" nodeType="tmRoot"/>
+      </p:par>
+    </p:tnLst>
+  </p:timing>
+</p:sld>
+</file>
+
+<file path=ppt/slides/slide26.xml><?xml version="1.0" encoding="utf-8"?>
+<p:sld xmlns:a="http://schemas.openxmlformats.org/drawingml/2006/main" xmlns:r="http://schemas.openxmlformats.org/officeDocument/2006/relationships" xmlns:mc="http://schemas.openxmlformats.org/markup-compatibility/2006" xmlns:mv="urn:schemas-microsoft-com:mac:vml" xmlns:p="http://schemas.openxmlformats.org/presentationml/2006/main" mc:Ignorable="mv" mc:PreserveAttributes="mv:*">
+  <p:cSld>
+    <p:spTree>
+      <p:nvGrpSpPr>
+        <p:cNvPr id="1" name=""/>
+        <p:cNvGrpSpPr/>
+        <p:nvPr/>
+      </p:nvGrpSpPr>
+      <p:grpSpPr>
+        <a:xfrm>
+          <a:off x="0" y="0"/>
+          <a:ext cx="0" cy="0"/>
+          <a:chOff x="0" y="0"/>
+          <a:chExt cx="0" cy="0"/>
+        </a:xfrm>
+      </p:grpSpPr>
+      <p:sp>
+        <p:nvSpPr>
+          <p:cNvPr id="2" name="Content Placeholder 1"/>
+          <p:cNvSpPr>
+            <a:spLocks noGrp="1"/>
+          </p:cNvSpPr>
+          <p:nvPr>
+            <p:ph idx="1"/>
+          </p:nvPr>
+        </p:nvSpPr>
+        <p:spPr/>
+        <p:txBody>
+          <a:bodyPr/>
+          <a:lstStyle/>
+          <a:p>
             <a:endParaRPr lang="lt-LT"/>
           </a:p>
         </p:txBody>
@@ -5732,10 +7455,6 @@
             <a:r>
               <a:rPr lang="en-US" dirty="0" smtClean="0"/>
               <a:t>Animating human body</a:t>
-            </a:r>
-            <a:r>
-              <a:rPr lang="en-US" dirty="0" smtClean="0"/>
-              <a:t/>
             </a:r>
             <a:br>
               <a:rPr lang="en-US" dirty="0" smtClean="0"/>
@@ -5779,11 +7498,18 @@
   <p:clrMapOvr>
     <a:masterClrMapping/>
   </p:clrMapOvr>
+  <p:timing>
+    <p:tnLst>
+      <p:par>
+        <p:cTn id="1" dur="indefinite" restart="never" nodeType="tmRoot"/>
+      </p:par>
+    </p:tnLst>
+  </p:timing>
 </p:sld>
 </file>
 
-<file path=ppt/slides/slide2.xml><?xml version="1.0" encoding="utf-8"?>
-<p:sld xmlns:a="http://schemas.openxmlformats.org/drawingml/2006/main" xmlns:r="http://schemas.openxmlformats.org/officeDocument/2006/relationships" xmlns:p="http://schemas.openxmlformats.org/presentationml/2006/main">
+<file path=ppt/slides/slide27.xml><?xml version="1.0" encoding="utf-8"?>
+<p:sld xmlns:a="http://schemas.openxmlformats.org/drawingml/2006/main" xmlns:r="http://schemas.openxmlformats.org/officeDocument/2006/relationships" xmlns:mc="http://schemas.openxmlformats.org/markup-compatibility/2006" xmlns:mv="urn:schemas-microsoft-com:mac:vml" xmlns:p="http://schemas.openxmlformats.org/presentationml/2006/main" mc:Ignorable="mv" mc:PreserveAttributes="mv:*">
   <p:cSld>
     <p:spTree>
       <p:nvGrpSpPr>
@@ -5815,129 +7541,6 @@
           <a:lstStyle/>
           <a:p>
             <a:r>
-              <a:rPr lang="lt-LT" dirty="0" smtClean="0"/>
-              <a:t>Introduction</a:t>
-            </a:r>
-          </a:p>
-          <a:p>
-            <a:r>
-              <a:rPr lang="lt-LT" dirty="0" smtClean="0"/>
-              <a:t>Motion capture and motion data</a:t>
-            </a:r>
-          </a:p>
-          <a:p>
-            <a:r>
-              <a:rPr lang="lt-LT" dirty="0" smtClean="0"/>
-              <a:t>Used </a:t>
-            </a:r>
-            <a:r>
-              <a:rPr lang="en-US" dirty="0" smtClean="0"/>
-              <a:t>techniques</a:t>
-            </a:r>
-          </a:p>
-          <a:p>
-            <a:r>
-              <a:rPr lang="lt-LT" dirty="0" smtClean="0"/>
-              <a:t>Animating human body</a:t>
-            </a:r>
-          </a:p>
-          <a:p>
-            <a:r>
-              <a:rPr lang="lt-LT" dirty="0" smtClean="0"/>
-              <a:t>Problems</a:t>
-            </a:r>
-            <a:endParaRPr lang="en-US" dirty="0" smtClean="0"/>
-          </a:p>
-          <a:p>
-            <a:r>
-              <a:rPr lang="en-US" dirty="0" smtClean="0"/>
-              <a:t>Conclusion and possible future tasks</a:t>
-            </a:r>
-            <a:endParaRPr lang="lt-LT" dirty="0" smtClean="0"/>
-          </a:p>
-          <a:p>
-            <a:endParaRPr lang="lt-LT" dirty="0" smtClean="0"/>
-          </a:p>
-          <a:p>
-            <a:pPr lvl="1"/>
-            <a:endParaRPr lang="lt-LT" dirty="0" smtClean="0"/>
-          </a:p>
-          <a:p>
-            <a:endParaRPr lang="lt-LT" dirty="0"/>
-          </a:p>
-        </p:txBody>
-      </p:sp>
-      <p:sp>
-        <p:nvSpPr>
-          <p:cNvPr id="3" name="Title 2"/>
-          <p:cNvSpPr>
-            <a:spLocks noGrp="1"/>
-          </p:cNvSpPr>
-          <p:nvPr>
-            <p:ph type="title"/>
-          </p:nvPr>
-        </p:nvSpPr>
-        <p:spPr/>
-        <p:txBody>
-          <a:bodyPr/>
-          <a:lstStyle/>
-          <a:p>
-            <a:r>
-              <a:rPr lang="lt-LT" dirty="0" smtClean="0"/>
-              <a:t>Contents</a:t>
-            </a:r>
-            <a:endParaRPr lang="lt-LT" dirty="0"/>
-          </a:p>
-        </p:txBody>
-      </p:sp>
-    </p:spTree>
-  </p:cSld>
-  <p:clrMapOvr>
-    <a:masterClrMapping/>
-  </p:clrMapOvr>
-  <p:timing>
-    <p:tnLst>
-      <p:par>
-        <p:cTn id="1" dur="indefinite" restart="never" nodeType="tmRoot"/>
-      </p:par>
-    </p:tnLst>
-  </p:timing>
-</p:sld>
-</file>
-
-<file path=ppt/slides/slide20.xml><?xml version="1.0" encoding="utf-8"?>
-<p:sld xmlns:a="http://schemas.openxmlformats.org/drawingml/2006/main" xmlns:r="http://schemas.openxmlformats.org/officeDocument/2006/relationships" xmlns:p="http://schemas.openxmlformats.org/presentationml/2006/main">
-  <p:cSld>
-    <p:spTree>
-      <p:nvGrpSpPr>
-        <p:cNvPr id="1" name=""/>
-        <p:cNvGrpSpPr/>
-        <p:nvPr/>
-      </p:nvGrpSpPr>
-      <p:grpSpPr>
-        <a:xfrm>
-          <a:off x="0" y="0"/>
-          <a:ext cx="0" cy="0"/>
-          <a:chOff x="0" y="0"/>
-          <a:chExt cx="0" cy="0"/>
-        </a:xfrm>
-      </p:grpSpPr>
-      <p:sp>
-        <p:nvSpPr>
-          <p:cNvPr id="2" name="Content Placeholder 1"/>
-          <p:cNvSpPr>
-            <a:spLocks noGrp="1"/>
-          </p:cNvSpPr>
-          <p:nvPr>
-            <p:ph idx="1"/>
-          </p:nvPr>
-        </p:nvSpPr>
-        <p:spPr/>
-        <p:txBody>
-          <a:bodyPr/>
-          <a:lstStyle/>
-          <a:p>
-            <a:r>
               <a:rPr lang="en-US" dirty="0" smtClean="0"/>
               <a:t>Every vertex on the connecting line is assigned a weight (by its position on the line)</a:t>
             </a:r>
@@ -5956,7 +7559,6 @@
               <a:rPr lang="en-US" sz="2000" dirty="0" smtClean="0"/>
               <a:t>P=1..N</a:t>
             </a:r>
-            <a:endParaRPr lang="en-US" sz="2000" dirty="0" smtClean="0"/>
           </a:p>
           <a:p>
             <a:r>
@@ -6143,11 +7745,18 @@
   <p:clrMapOvr>
     <a:masterClrMapping/>
   </p:clrMapOvr>
+  <p:timing>
+    <p:tnLst>
+      <p:par>
+        <p:cTn id="1" dur="indefinite" restart="never" nodeType="tmRoot"/>
+      </p:par>
+    </p:tnLst>
+  </p:timing>
 </p:sld>
 </file>
 
-<file path=ppt/slides/slide21.xml><?xml version="1.0" encoding="utf-8"?>
-<p:sld xmlns:a="http://schemas.openxmlformats.org/drawingml/2006/main" xmlns:r="http://schemas.openxmlformats.org/officeDocument/2006/relationships" xmlns:p="http://schemas.openxmlformats.org/presentationml/2006/main">
+<file path=ppt/slides/slide28.xml><?xml version="1.0" encoding="utf-8"?>
+<p:sld xmlns:a="http://schemas.openxmlformats.org/drawingml/2006/main" xmlns:r="http://schemas.openxmlformats.org/officeDocument/2006/relationships" xmlns:mc="http://schemas.openxmlformats.org/markup-compatibility/2006" xmlns:mv="urn:schemas-microsoft-com:mac:vml" xmlns:p="http://schemas.openxmlformats.org/presentationml/2006/main" mc:Ignorable="mv" mc:PreserveAttributes="mv:*">
   <p:cSld>
     <p:spTree>
       <p:nvGrpSpPr>
@@ -6235,11 +7844,18 @@
   <p:clrMapOvr>
     <a:masterClrMapping/>
   </p:clrMapOvr>
+  <p:timing>
+    <p:tnLst>
+      <p:par>
+        <p:cTn id="1" dur="indefinite" restart="never" nodeType="tmRoot"/>
+      </p:par>
+    </p:tnLst>
+  </p:timing>
 </p:sld>
 </file>
 
-<file path=ppt/slides/slide22.xml><?xml version="1.0" encoding="utf-8"?>
-<p:sld xmlns:a="http://schemas.openxmlformats.org/drawingml/2006/main" xmlns:r="http://schemas.openxmlformats.org/officeDocument/2006/relationships" xmlns:p="http://schemas.openxmlformats.org/presentationml/2006/main">
+<file path=ppt/slides/slide29.xml><?xml version="1.0" encoding="utf-8"?>
+<p:sld xmlns:a="http://schemas.openxmlformats.org/drawingml/2006/main" xmlns:r="http://schemas.openxmlformats.org/officeDocument/2006/relationships" xmlns:mc="http://schemas.openxmlformats.org/markup-compatibility/2006" xmlns:mv="urn:schemas-microsoft-com:mac:vml" xmlns:p="http://schemas.openxmlformats.org/presentationml/2006/main" mc:Ignorable="mv" mc:PreserveAttributes="mv:*">
   <p:cSld>
     <p:spTree>
       <p:nvGrpSpPr>
@@ -6306,317 +7922,6 @@
               <a:t>Initial BVH pose</a:t>
             </a:r>
             <a:endParaRPr lang="en-US" sz="3100" dirty="0"/>
-          </a:p>
-        </p:txBody>
-      </p:sp>
-    </p:spTree>
-  </p:cSld>
-  <p:clrMapOvr>
-    <a:masterClrMapping/>
-  </p:clrMapOvr>
-</p:sld>
-</file>
-
-<file path=ppt/slides/slide23.xml><?xml version="1.0" encoding="utf-8"?>
-<p:sld xmlns:a="http://schemas.openxmlformats.org/drawingml/2006/main" xmlns:r="http://schemas.openxmlformats.org/officeDocument/2006/relationships" xmlns:p="http://schemas.openxmlformats.org/presentationml/2006/main">
-  <p:cSld>
-    <p:spTree>
-      <p:nvGrpSpPr>
-        <p:cNvPr id="1" name=""/>
-        <p:cNvGrpSpPr/>
-        <p:nvPr/>
-      </p:nvGrpSpPr>
-      <p:grpSpPr>
-        <a:xfrm>
-          <a:off x="0" y="0"/>
-          <a:ext cx="0" cy="0"/>
-          <a:chOff x="0" y="0"/>
-          <a:chExt cx="0" cy="0"/>
-        </a:xfrm>
-      </p:grpSpPr>
-      <p:sp>
-        <p:nvSpPr>
-          <p:cNvPr id="2" name="Content Placeholder 1"/>
-          <p:cNvSpPr>
-            <a:spLocks noGrp="1"/>
-          </p:cNvSpPr>
-          <p:nvPr>
-            <p:ph idx="1"/>
-          </p:nvPr>
-        </p:nvSpPr>
-        <p:spPr/>
-        <p:txBody>
-          <a:bodyPr/>
-          <a:lstStyle/>
-          <a:p>
-            <a:pPr>
-              <a:buNone/>
-            </a:pPr>
-            <a:endParaRPr lang="lt-LT" dirty="0"/>
-          </a:p>
-        </p:txBody>
-      </p:sp>
-      <p:sp>
-        <p:nvSpPr>
-          <p:cNvPr id="3" name="Title 2"/>
-          <p:cNvSpPr>
-            <a:spLocks noGrp="1"/>
-          </p:cNvSpPr>
-          <p:nvPr>
-            <p:ph type="title"/>
-          </p:nvPr>
-        </p:nvSpPr>
-        <p:spPr/>
-        <p:txBody>
-          <a:bodyPr>
-            <a:normAutofit fontScale="90000"/>
-          </a:bodyPr>
-          <a:lstStyle/>
-          <a:p>
-            <a:r>
-              <a:rPr lang="en-US" dirty="0" smtClean="0"/>
-              <a:t>Problems</a:t>
-            </a:r>
-            <a:br>
-              <a:rPr lang="en-US" dirty="0" smtClean="0"/>
-            </a:br>
-            <a:r>
-              <a:rPr lang="lt-LT" sz="3100" dirty="0" smtClean="0"/>
-              <a:t>Exploding knee problem</a:t>
-            </a:r>
-            <a:endParaRPr lang="en-US" sz="3100" dirty="0"/>
-          </a:p>
-        </p:txBody>
-      </p:sp>
-    </p:spTree>
-  </p:cSld>
-  <p:clrMapOvr>
-    <a:masterClrMapping/>
-  </p:clrMapOvr>
-</p:sld>
-</file>
-
-<file path=ppt/slides/slide24.xml><?xml version="1.0" encoding="utf-8"?>
-<p:sld xmlns:a="http://schemas.openxmlformats.org/drawingml/2006/main" xmlns:r="http://schemas.openxmlformats.org/officeDocument/2006/relationships" xmlns:p="http://schemas.openxmlformats.org/presentationml/2006/main">
-  <p:cSld>
-    <p:spTree>
-      <p:nvGrpSpPr>
-        <p:cNvPr id="1" name=""/>
-        <p:cNvGrpSpPr/>
-        <p:nvPr/>
-      </p:nvGrpSpPr>
-      <p:grpSpPr>
-        <a:xfrm>
-          <a:off x="0" y="0"/>
-          <a:ext cx="0" cy="0"/>
-          <a:chOff x="0" y="0"/>
-          <a:chExt cx="0" cy="0"/>
-        </a:xfrm>
-      </p:grpSpPr>
-      <p:sp>
-        <p:nvSpPr>
-          <p:cNvPr id="2" name="Content Placeholder 1"/>
-          <p:cNvSpPr>
-            <a:spLocks noGrp="1"/>
-          </p:cNvSpPr>
-          <p:nvPr>
-            <p:ph idx="1"/>
-          </p:nvPr>
-        </p:nvSpPr>
-        <p:spPr/>
-        <p:txBody>
-          <a:bodyPr/>
-          <a:lstStyle/>
-          <a:p>
-            <a:pPr>
-              <a:buNone/>
-            </a:pPr>
-            <a:endParaRPr lang="lt-LT" dirty="0"/>
-          </a:p>
-        </p:txBody>
-      </p:sp>
-      <p:sp>
-        <p:nvSpPr>
-          <p:cNvPr id="3" name="Title 2"/>
-          <p:cNvSpPr>
-            <a:spLocks noGrp="1"/>
-          </p:cNvSpPr>
-          <p:nvPr>
-            <p:ph type="title"/>
-          </p:nvPr>
-        </p:nvSpPr>
-        <p:spPr/>
-        <p:txBody>
-          <a:bodyPr>
-            <a:normAutofit fontScale="90000"/>
-          </a:bodyPr>
-          <a:lstStyle/>
-          <a:p>
-            <a:r>
-              <a:rPr lang="en-US" dirty="0" smtClean="0"/>
-              <a:t>Problems</a:t>
-            </a:r>
-            <a:br>
-              <a:rPr lang="en-US" dirty="0" smtClean="0"/>
-            </a:br>
-            <a:r>
-              <a:rPr lang="en-US" sz="3100" dirty="0" smtClean="0"/>
-              <a:t>Mesh connections collapsing on com</a:t>
-            </a:r>
-            <a:r>
-              <a:rPr lang="lt-LT" sz="3100" dirty="0" smtClean="0"/>
-              <a:t>plex deformations</a:t>
-            </a:r>
-            <a:endParaRPr lang="en-US" sz="3100" dirty="0"/>
-          </a:p>
-        </p:txBody>
-      </p:sp>
-    </p:spTree>
-  </p:cSld>
-  <p:clrMapOvr>
-    <a:masterClrMapping/>
-  </p:clrMapOvr>
-</p:sld>
-</file>
-
-<file path=ppt/slides/slide25.xml><?xml version="1.0" encoding="utf-8"?>
-<p:sld xmlns:a="http://schemas.openxmlformats.org/drawingml/2006/main" xmlns:r="http://schemas.openxmlformats.org/officeDocument/2006/relationships" xmlns:p="http://schemas.openxmlformats.org/presentationml/2006/main">
-  <p:cSld>
-    <p:spTree>
-      <p:nvGrpSpPr>
-        <p:cNvPr id="1" name=""/>
-        <p:cNvGrpSpPr/>
-        <p:nvPr/>
-      </p:nvGrpSpPr>
-      <p:grpSpPr>
-        <a:xfrm>
-          <a:off x="0" y="0"/>
-          <a:ext cx="0" cy="0"/>
-          <a:chOff x="0" y="0"/>
-          <a:chExt cx="0" cy="0"/>
-        </a:xfrm>
-      </p:grpSpPr>
-      <p:sp>
-        <p:nvSpPr>
-          <p:cNvPr id="2" name="Content Placeholder 1"/>
-          <p:cNvSpPr>
-            <a:spLocks noGrp="1"/>
-          </p:cNvSpPr>
-          <p:nvPr>
-            <p:ph idx="1"/>
-          </p:nvPr>
-        </p:nvSpPr>
-        <p:spPr/>
-        <p:txBody>
-          <a:bodyPr/>
-          <a:lstStyle/>
-          <a:p>
-            <a:endParaRPr lang="lt-LT"/>
-          </a:p>
-        </p:txBody>
-      </p:sp>
-      <p:sp>
-        <p:nvSpPr>
-          <p:cNvPr id="3" name="Title 2"/>
-          <p:cNvSpPr>
-            <a:spLocks noGrp="1"/>
-          </p:cNvSpPr>
-          <p:nvPr>
-            <p:ph type="title"/>
-          </p:nvPr>
-        </p:nvSpPr>
-        <p:spPr/>
-        <p:txBody>
-          <a:bodyPr>
-            <a:normAutofit fontScale="90000"/>
-          </a:bodyPr>
-          <a:lstStyle/>
-          <a:p>
-            <a:r>
-              <a:rPr lang="en-US" dirty="0" smtClean="0"/>
-              <a:t>Conclusion and future work possibilities</a:t>
-            </a:r>
-            <a:endParaRPr lang="lt-LT" dirty="0"/>
-          </a:p>
-        </p:txBody>
-      </p:sp>
-    </p:spTree>
-  </p:cSld>
-  <p:clrMapOvr>
-    <a:masterClrMapping/>
-  </p:clrMapOvr>
-</p:sld>
-</file>
-
-<file path=ppt/slides/slide26.xml><?xml version="1.0" encoding="utf-8"?>
-<p:sld xmlns:a="http://schemas.openxmlformats.org/drawingml/2006/main" xmlns:r="http://schemas.openxmlformats.org/officeDocument/2006/relationships" xmlns:p="http://schemas.openxmlformats.org/presentationml/2006/main">
-  <p:cSld>
-    <p:spTree>
-      <p:nvGrpSpPr>
-        <p:cNvPr id="1" name=""/>
-        <p:cNvGrpSpPr/>
-        <p:nvPr/>
-      </p:nvGrpSpPr>
-      <p:grpSpPr>
-        <a:xfrm>
-          <a:off x="0" y="0"/>
-          <a:ext cx="0" cy="0"/>
-          <a:chOff x="0" y="0"/>
-          <a:chExt cx="0" cy="0"/>
-        </a:xfrm>
-      </p:grpSpPr>
-      <p:sp>
-        <p:nvSpPr>
-          <p:cNvPr id="2" name="Content Placeholder 1"/>
-          <p:cNvSpPr>
-            <a:spLocks noGrp="1"/>
-          </p:cNvSpPr>
-          <p:nvPr>
-            <p:ph idx="1"/>
-          </p:nvPr>
-        </p:nvSpPr>
-        <p:spPr/>
-        <p:txBody>
-          <a:bodyPr/>
-          <a:lstStyle/>
-          <a:p>
-            <a:pPr algn="ctr">
-              <a:buNone/>
-            </a:pPr>
-            <a:endParaRPr lang="lt-LT" sz="8000" dirty="0" smtClean="0"/>
-          </a:p>
-          <a:p>
-            <a:pPr algn="ctr">
-              <a:buNone/>
-            </a:pPr>
-            <a:r>
-              <a:rPr lang="lt-LT" sz="8000" dirty="0" smtClean="0"/>
-              <a:t>?</a:t>
-            </a:r>
-            <a:endParaRPr lang="lt-LT" sz="8000" dirty="0"/>
-          </a:p>
-        </p:txBody>
-      </p:sp>
-      <p:sp>
-        <p:nvSpPr>
-          <p:cNvPr id="3" name="Title 2"/>
-          <p:cNvSpPr>
-            <a:spLocks noGrp="1"/>
-          </p:cNvSpPr>
-          <p:nvPr>
-            <p:ph type="title"/>
-          </p:nvPr>
-        </p:nvSpPr>
-        <p:spPr/>
-        <p:txBody>
-          <a:bodyPr/>
-          <a:lstStyle/>
-          <a:p>
-            <a:r>
-              <a:rPr lang="lt-LT" dirty="0" smtClean="0"/>
-              <a:t>Questions, comments</a:t>
-            </a:r>
-            <a:endParaRPr lang="lt-LT" dirty="0"/>
           </a:p>
         </p:txBody>
       </p:sp>
@@ -6636,7 +7941,7 @@
 </file>
 
 <file path=ppt/slides/slide3.xml><?xml version="1.0" encoding="utf-8"?>
-<p:sld xmlns:a="http://schemas.openxmlformats.org/drawingml/2006/main" xmlns:r="http://schemas.openxmlformats.org/officeDocument/2006/relationships" xmlns:p="http://schemas.openxmlformats.org/presentationml/2006/main">
+<p:sld xmlns:a="http://schemas.openxmlformats.org/drawingml/2006/main" xmlns:r="http://schemas.openxmlformats.org/officeDocument/2006/relationships" xmlns:mc="http://schemas.openxmlformats.org/markup-compatibility/2006" xmlns:mv="urn:schemas-microsoft-com:mac:vml" xmlns:p="http://schemas.openxmlformats.org/presentationml/2006/main" mc:Ignorable="mv" mc:PreserveAttributes="mv:*">
   <p:cSld>
     <p:spTree>
       <p:nvGrpSpPr>
@@ -6737,6 +8042,345 @@
               <a:t>Introduction. Project tasks</a:t>
             </a:r>
             <a:endParaRPr lang="en-US" dirty="0"/>
+          </a:p>
+        </p:txBody>
+      </p:sp>
+    </p:spTree>
+  </p:cSld>
+  <p:clrMapOvr>
+    <a:masterClrMapping/>
+  </p:clrMapOvr>
+  <p:timing>
+    <p:tnLst>
+      <p:par>
+        <p:cTn id="1" dur="indefinite" restart="never" nodeType="tmRoot"/>
+      </p:par>
+    </p:tnLst>
+  </p:timing>
+</p:sld>
+</file>
+
+<file path=ppt/slides/slide30.xml><?xml version="1.0" encoding="utf-8"?>
+<p:sld xmlns:a="http://schemas.openxmlformats.org/drawingml/2006/main" xmlns:r="http://schemas.openxmlformats.org/officeDocument/2006/relationships" xmlns:mc="http://schemas.openxmlformats.org/markup-compatibility/2006" xmlns:mv="urn:schemas-microsoft-com:mac:vml" xmlns:p="http://schemas.openxmlformats.org/presentationml/2006/main" mc:Ignorable="mv" mc:PreserveAttributes="mv:*">
+  <p:cSld>
+    <p:spTree>
+      <p:nvGrpSpPr>
+        <p:cNvPr id="1" name=""/>
+        <p:cNvGrpSpPr/>
+        <p:nvPr/>
+      </p:nvGrpSpPr>
+      <p:grpSpPr>
+        <a:xfrm>
+          <a:off x="0" y="0"/>
+          <a:ext cx="0" cy="0"/>
+          <a:chOff x="0" y="0"/>
+          <a:chExt cx="0" cy="0"/>
+        </a:xfrm>
+      </p:grpSpPr>
+      <p:sp>
+        <p:nvSpPr>
+          <p:cNvPr id="2" name="Content Placeholder 1"/>
+          <p:cNvSpPr>
+            <a:spLocks noGrp="1"/>
+          </p:cNvSpPr>
+          <p:nvPr>
+            <p:ph idx="1"/>
+          </p:nvPr>
+        </p:nvSpPr>
+        <p:spPr/>
+        <p:txBody>
+          <a:bodyPr/>
+          <a:lstStyle/>
+          <a:p>
+            <a:pPr>
+              <a:buNone/>
+            </a:pPr>
+            <a:endParaRPr lang="lt-LT" dirty="0"/>
+          </a:p>
+        </p:txBody>
+      </p:sp>
+      <p:sp>
+        <p:nvSpPr>
+          <p:cNvPr id="3" name="Title 2"/>
+          <p:cNvSpPr>
+            <a:spLocks noGrp="1"/>
+          </p:cNvSpPr>
+          <p:nvPr>
+            <p:ph type="title"/>
+          </p:nvPr>
+        </p:nvSpPr>
+        <p:spPr/>
+        <p:txBody>
+          <a:bodyPr>
+            <a:normAutofit fontScale="90000"/>
+          </a:bodyPr>
+          <a:lstStyle/>
+          <a:p>
+            <a:r>
+              <a:rPr lang="en-US" dirty="0" smtClean="0"/>
+              <a:t>Problems</a:t>
+            </a:r>
+            <a:br>
+              <a:rPr lang="en-US" dirty="0" smtClean="0"/>
+            </a:br>
+            <a:r>
+              <a:rPr lang="lt-LT" sz="3100" dirty="0" smtClean="0"/>
+              <a:t>Exploding knee problem</a:t>
+            </a:r>
+            <a:endParaRPr lang="en-US" sz="3100" dirty="0"/>
+          </a:p>
+        </p:txBody>
+      </p:sp>
+    </p:spTree>
+  </p:cSld>
+  <p:clrMapOvr>
+    <a:masterClrMapping/>
+  </p:clrMapOvr>
+  <p:timing>
+    <p:tnLst>
+      <p:par>
+        <p:cTn id="1" dur="indefinite" restart="never" nodeType="tmRoot"/>
+      </p:par>
+    </p:tnLst>
+  </p:timing>
+</p:sld>
+</file>
+
+<file path=ppt/slides/slide31.xml><?xml version="1.0" encoding="utf-8"?>
+<p:sld xmlns:a="http://schemas.openxmlformats.org/drawingml/2006/main" xmlns:r="http://schemas.openxmlformats.org/officeDocument/2006/relationships" xmlns:mc="http://schemas.openxmlformats.org/markup-compatibility/2006" xmlns:mv="urn:schemas-microsoft-com:mac:vml" xmlns:p="http://schemas.openxmlformats.org/presentationml/2006/main" mc:Ignorable="mv" mc:PreserveAttributes="mv:*">
+  <p:cSld>
+    <p:spTree>
+      <p:nvGrpSpPr>
+        <p:cNvPr id="1" name=""/>
+        <p:cNvGrpSpPr/>
+        <p:nvPr/>
+      </p:nvGrpSpPr>
+      <p:grpSpPr>
+        <a:xfrm>
+          <a:off x="0" y="0"/>
+          <a:ext cx="0" cy="0"/>
+          <a:chOff x="0" y="0"/>
+          <a:chExt cx="0" cy="0"/>
+        </a:xfrm>
+      </p:grpSpPr>
+      <p:sp>
+        <p:nvSpPr>
+          <p:cNvPr id="2" name="Content Placeholder 1"/>
+          <p:cNvSpPr>
+            <a:spLocks noGrp="1"/>
+          </p:cNvSpPr>
+          <p:nvPr>
+            <p:ph idx="1"/>
+          </p:nvPr>
+        </p:nvSpPr>
+        <p:spPr/>
+        <p:txBody>
+          <a:bodyPr/>
+          <a:lstStyle/>
+          <a:p>
+            <a:pPr>
+              <a:buNone/>
+            </a:pPr>
+            <a:endParaRPr lang="lt-LT" dirty="0"/>
+          </a:p>
+        </p:txBody>
+      </p:sp>
+      <p:sp>
+        <p:nvSpPr>
+          <p:cNvPr id="3" name="Title 2"/>
+          <p:cNvSpPr>
+            <a:spLocks noGrp="1"/>
+          </p:cNvSpPr>
+          <p:nvPr>
+            <p:ph type="title"/>
+          </p:nvPr>
+        </p:nvSpPr>
+        <p:spPr/>
+        <p:txBody>
+          <a:bodyPr>
+            <a:normAutofit fontScale="90000"/>
+          </a:bodyPr>
+          <a:lstStyle/>
+          <a:p>
+            <a:r>
+              <a:rPr lang="en-US" dirty="0" smtClean="0"/>
+              <a:t>Problems</a:t>
+            </a:r>
+            <a:br>
+              <a:rPr lang="en-US" dirty="0" smtClean="0"/>
+            </a:br>
+            <a:r>
+              <a:rPr lang="en-US" sz="3100" dirty="0" smtClean="0"/>
+              <a:t>Mesh connections collapsing on com</a:t>
+            </a:r>
+            <a:r>
+              <a:rPr lang="lt-LT" sz="3100" dirty="0" smtClean="0"/>
+              <a:t>plex deformations</a:t>
+            </a:r>
+            <a:endParaRPr lang="en-US" sz="3100" dirty="0"/>
+          </a:p>
+        </p:txBody>
+      </p:sp>
+    </p:spTree>
+  </p:cSld>
+  <p:clrMapOvr>
+    <a:masterClrMapping/>
+  </p:clrMapOvr>
+  <p:timing>
+    <p:tnLst>
+      <p:par>
+        <p:cTn id="1" dur="indefinite" restart="never" nodeType="tmRoot"/>
+      </p:par>
+    </p:tnLst>
+  </p:timing>
+</p:sld>
+</file>
+
+<file path=ppt/slides/slide32.xml><?xml version="1.0" encoding="utf-8"?>
+<p:sld xmlns:a="http://schemas.openxmlformats.org/drawingml/2006/main" xmlns:r="http://schemas.openxmlformats.org/officeDocument/2006/relationships" xmlns:mc="http://schemas.openxmlformats.org/markup-compatibility/2006" xmlns:mv="urn:schemas-microsoft-com:mac:vml" xmlns:p="http://schemas.openxmlformats.org/presentationml/2006/main" mc:Ignorable="mv" mc:PreserveAttributes="mv:*">
+  <p:cSld>
+    <p:spTree>
+      <p:nvGrpSpPr>
+        <p:cNvPr id="1" name=""/>
+        <p:cNvGrpSpPr/>
+        <p:nvPr/>
+      </p:nvGrpSpPr>
+      <p:grpSpPr>
+        <a:xfrm>
+          <a:off x="0" y="0"/>
+          <a:ext cx="0" cy="0"/>
+          <a:chOff x="0" y="0"/>
+          <a:chExt cx="0" cy="0"/>
+        </a:xfrm>
+      </p:grpSpPr>
+      <p:sp>
+        <p:nvSpPr>
+          <p:cNvPr id="2" name="Content Placeholder 1"/>
+          <p:cNvSpPr>
+            <a:spLocks noGrp="1"/>
+          </p:cNvSpPr>
+          <p:nvPr>
+            <p:ph idx="1"/>
+          </p:nvPr>
+        </p:nvSpPr>
+        <p:spPr/>
+        <p:txBody>
+          <a:bodyPr/>
+          <a:lstStyle/>
+          <a:p>
+            <a:endParaRPr lang="lt-LT"/>
+          </a:p>
+        </p:txBody>
+      </p:sp>
+      <p:sp>
+        <p:nvSpPr>
+          <p:cNvPr id="3" name="Title 2"/>
+          <p:cNvSpPr>
+            <a:spLocks noGrp="1"/>
+          </p:cNvSpPr>
+          <p:nvPr>
+            <p:ph type="title"/>
+          </p:nvPr>
+        </p:nvSpPr>
+        <p:spPr/>
+        <p:txBody>
+          <a:bodyPr>
+            <a:normAutofit fontScale="90000"/>
+          </a:bodyPr>
+          <a:lstStyle/>
+          <a:p>
+            <a:r>
+              <a:rPr lang="en-US" dirty="0" smtClean="0"/>
+              <a:t>Conclusion and future work possibilities</a:t>
+            </a:r>
+            <a:endParaRPr lang="lt-LT" dirty="0"/>
+          </a:p>
+        </p:txBody>
+      </p:sp>
+    </p:spTree>
+  </p:cSld>
+  <p:clrMapOvr>
+    <a:masterClrMapping/>
+  </p:clrMapOvr>
+  <p:timing>
+    <p:tnLst>
+      <p:par>
+        <p:cTn id="1" dur="indefinite" restart="never" nodeType="tmRoot"/>
+      </p:par>
+    </p:tnLst>
+  </p:timing>
+</p:sld>
+</file>
+
+<file path=ppt/slides/slide33.xml><?xml version="1.0" encoding="utf-8"?>
+<p:sld xmlns:a="http://schemas.openxmlformats.org/drawingml/2006/main" xmlns:r="http://schemas.openxmlformats.org/officeDocument/2006/relationships" xmlns:mc="http://schemas.openxmlformats.org/markup-compatibility/2006" xmlns:mv="urn:schemas-microsoft-com:mac:vml" xmlns:p="http://schemas.openxmlformats.org/presentationml/2006/main" mc:Ignorable="mv" mc:PreserveAttributes="mv:*">
+  <p:cSld>
+    <p:spTree>
+      <p:nvGrpSpPr>
+        <p:cNvPr id="1" name=""/>
+        <p:cNvGrpSpPr/>
+        <p:nvPr/>
+      </p:nvGrpSpPr>
+      <p:grpSpPr>
+        <a:xfrm>
+          <a:off x="0" y="0"/>
+          <a:ext cx="0" cy="0"/>
+          <a:chOff x="0" y="0"/>
+          <a:chExt cx="0" cy="0"/>
+        </a:xfrm>
+      </p:grpSpPr>
+      <p:sp>
+        <p:nvSpPr>
+          <p:cNvPr id="2" name="Content Placeholder 1"/>
+          <p:cNvSpPr>
+            <a:spLocks noGrp="1"/>
+          </p:cNvSpPr>
+          <p:nvPr>
+            <p:ph idx="1"/>
+          </p:nvPr>
+        </p:nvSpPr>
+        <p:spPr/>
+        <p:txBody>
+          <a:bodyPr/>
+          <a:lstStyle/>
+          <a:p>
+            <a:pPr algn="ctr">
+              <a:buNone/>
+            </a:pPr>
+            <a:endParaRPr lang="lt-LT" sz="8000" dirty="0" smtClean="0"/>
+          </a:p>
+          <a:p>
+            <a:pPr algn="ctr">
+              <a:buNone/>
+            </a:pPr>
+            <a:r>
+              <a:rPr lang="lt-LT" sz="8000" dirty="0" smtClean="0"/>
+              <a:t>?</a:t>
+            </a:r>
+            <a:endParaRPr lang="lt-LT" sz="8000" dirty="0"/>
+          </a:p>
+        </p:txBody>
+      </p:sp>
+      <p:sp>
+        <p:nvSpPr>
+          <p:cNvPr id="3" name="Title 2"/>
+          <p:cNvSpPr>
+            <a:spLocks noGrp="1"/>
+          </p:cNvSpPr>
+          <p:nvPr>
+            <p:ph type="title"/>
+          </p:nvPr>
+        </p:nvSpPr>
+        <p:spPr/>
+        <p:txBody>
+          <a:bodyPr/>
+          <a:lstStyle/>
+          <a:p>
+            <a:r>
+              <a:rPr lang="lt-LT" dirty="0" smtClean="0"/>
+              <a:t>Questions, comments</a:t>
+            </a:r>
+            <a:endParaRPr lang="lt-LT" dirty="0"/>
           </a:p>
         </p:txBody>
       </p:sp>
@@ -6756,7 +8400,7 @@
 </file>
 
 <file path=ppt/slides/slide4.xml><?xml version="1.0" encoding="utf-8"?>
-<p:sld xmlns:a="http://schemas.openxmlformats.org/drawingml/2006/main" xmlns:r="http://schemas.openxmlformats.org/officeDocument/2006/relationships" xmlns:p="http://schemas.openxmlformats.org/presentationml/2006/main">
+<p:sld xmlns:a="http://schemas.openxmlformats.org/drawingml/2006/main" xmlns:r="http://schemas.openxmlformats.org/officeDocument/2006/relationships" xmlns:mc="http://schemas.openxmlformats.org/markup-compatibility/2006" xmlns:mv="urn:schemas-microsoft-com:mac:vml" xmlns:p="http://schemas.openxmlformats.org/presentationml/2006/main" mc:Ignorable="mv" mc:PreserveAttributes="mv:*">
   <p:cSld>
     <p:spTree>
       <p:nvGrpSpPr>
@@ -6819,11 +8463,18 @@
   <p:clrMapOvr>
     <a:masterClrMapping/>
   </p:clrMapOvr>
+  <p:timing>
+    <p:tnLst>
+      <p:par>
+        <p:cTn id="1" dur="indefinite" restart="never" nodeType="tmRoot"/>
+      </p:par>
+    </p:tnLst>
+  </p:timing>
 </p:sld>
 </file>
 
 <file path=ppt/slides/slide5.xml><?xml version="1.0" encoding="utf-8"?>
-<p:sld xmlns:a="http://schemas.openxmlformats.org/drawingml/2006/main" xmlns:r="http://schemas.openxmlformats.org/officeDocument/2006/relationships" xmlns:p="http://schemas.openxmlformats.org/presentationml/2006/main">
+<p:sld xmlns:a="http://schemas.openxmlformats.org/drawingml/2006/main" xmlns:r="http://schemas.openxmlformats.org/officeDocument/2006/relationships" xmlns:mc="http://schemas.openxmlformats.org/markup-compatibility/2006" xmlns:mv="urn:schemas-microsoft-com:mac:vml" xmlns:p="http://schemas.openxmlformats.org/presentationml/2006/main" mc:Ignorable="mv" mc:PreserveAttributes="mv:*">
   <p:cSld>
     <p:spTree>
       <p:nvGrpSpPr>
@@ -7009,11 +8660,18 @@
   <p:clrMapOvr>
     <a:masterClrMapping/>
   </p:clrMapOvr>
+  <p:timing>
+    <p:tnLst>
+      <p:par>
+        <p:cTn id="1" dur="indefinite" restart="never" nodeType="tmRoot"/>
+      </p:par>
+    </p:tnLst>
+  </p:timing>
 </p:sld>
 </file>
 
 <file path=ppt/slides/slide6.xml><?xml version="1.0" encoding="utf-8"?>
-<p:sld xmlns:a="http://schemas.openxmlformats.org/drawingml/2006/main" xmlns:r="http://schemas.openxmlformats.org/officeDocument/2006/relationships" xmlns:p="http://schemas.openxmlformats.org/presentationml/2006/main">
+<p:sld xmlns:a="http://schemas.openxmlformats.org/drawingml/2006/main" xmlns:r="http://schemas.openxmlformats.org/officeDocument/2006/relationships" xmlns:mc="http://schemas.openxmlformats.org/markup-compatibility/2006" xmlns:mv="urn:schemas-microsoft-com:mac:vml" xmlns:p="http://schemas.openxmlformats.org/presentationml/2006/main" mc:Ignorable="mv" mc:PreserveAttributes="mv:*">
   <p:cSld>
     <p:spTree>
       <p:nvGrpSpPr>
@@ -7115,11 +8773,18 @@
   <p:clrMapOvr>
     <a:masterClrMapping/>
   </p:clrMapOvr>
+  <p:timing>
+    <p:tnLst>
+      <p:par>
+        <p:cTn id="1" dur="indefinite" restart="never" nodeType="tmRoot"/>
+      </p:par>
+    </p:tnLst>
+  </p:timing>
 </p:sld>
 </file>
 
 <file path=ppt/slides/slide7.xml><?xml version="1.0" encoding="utf-8"?>
-<p:sld xmlns:a="http://schemas.openxmlformats.org/drawingml/2006/main" xmlns:r="http://schemas.openxmlformats.org/officeDocument/2006/relationships" xmlns:p="http://schemas.openxmlformats.org/presentationml/2006/main">
+<p:sld xmlns:a="http://schemas.openxmlformats.org/drawingml/2006/main" xmlns:r="http://schemas.openxmlformats.org/officeDocument/2006/relationships" xmlns:mc="http://schemas.openxmlformats.org/markup-compatibility/2006" xmlns:mv="urn:schemas-microsoft-com:mac:vml" xmlns:p="http://schemas.openxmlformats.org/presentationml/2006/main" mc:Ignorable="mv" mc:PreserveAttributes="mv:*">
   <p:cSld>
     <p:spTree>
       <p:nvGrpSpPr>
@@ -7152,11 +8817,7 @@
           <a:p>
             <a:r>
               <a:rPr lang="lt-LT" dirty="0" smtClean="0"/>
-              <a:t>Various motion data </a:t>
-            </a:r>
-            <a:r>
-              <a:rPr lang="lt-LT" dirty="0" smtClean="0"/>
-              <a:t>formats</a:t>
+              <a:t>Various motion data formats</a:t>
             </a:r>
             <a:endParaRPr lang="en-US" dirty="0" smtClean="0"/>
           </a:p>
@@ -7198,11 +8859,7 @@
             <a:pPr lvl="1"/>
             <a:r>
               <a:rPr lang="lt-LT" dirty="0" smtClean="0"/>
-              <a:t>Default C3D format for Vicon Motion </a:t>
-            </a:r>
-            <a:r>
-              <a:rPr lang="lt-LT" dirty="0" smtClean="0"/>
-              <a:t>System</a:t>
+              <a:t>Default C3D format for Vicon Motion System</a:t>
             </a:r>
             <a:endParaRPr lang="en-US" dirty="0" smtClean="0"/>
           </a:p>
@@ -7218,11 +8875,7 @@
             <a:pPr lvl="1"/>
             <a:r>
               <a:rPr lang="lt-LT" dirty="0" smtClean="0"/>
-              <a:t>BVH format. Getting from C3D to </a:t>
-            </a:r>
-            <a:r>
-              <a:rPr lang="lt-LT" dirty="0" smtClean="0"/>
-              <a:t>BVH</a:t>
+              <a:t>BVH format. Getting from C3D to BVH</a:t>
             </a:r>
             <a:endParaRPr lang="en-US" dirty="0" smtClean="0"/>
           </a:p>
@@ -7264,11 +8917,18 @@
   <p:clrMapOvr>
     <a:masterClrMapping/>
   </p:clrMapOvr>
+  <p:timing>
+    <p:tnLst>
+      <p:par>
+        <p:cTn id="1" dur="indefinite" restart="never" nodeType="tmRoot"/>
+      </p:par>
+    </p:tnLst>
+  </p:timing>
 </p:sld>
 </file>
 
 <file path=ppt/slides/slide8.xml><?xml version="1.0" encoding="utf-8"?>
-<p:sld xmlns:a="http://schemas.openxmlformats.org/drawingml/2006/main" xmlns:r="http://schemas.openxmlformats.org/officeDocument/2006/relationships" xmlns:p="http://schemas.openxmlformats.org/presentationml/2006/main">
+<p:sld xmlns:a="http://schemas.openxmlformats.org/drawingml/2006/main" xmlns:r="http://schemas.openxmlformats.org/officeDocument/2006/relationships" xmlns:mc="http://schemas.openxmlformats.org/markup-compatibility/2006" xmlns:mv="urn:schemas-microsoft-com:mac:vml" xmlns:p="http://schemas.openxmlformats.org/presentationml/2006/main" mc:Ignorable="mv" mc:PreserveAttributes="mv:*">
   <p:cSld>
     <p:spTree>
       <p:nvGrpSpPr>
@@ -7324,11 +8984,7 @@
           <a:p>
             <a:r>
               <a:rPr lang="en-US" dirty="0" smtClean="0"/>
-              <a:t>Inverse/Forward??? </a:t>
-            </a:r>
-            <a:r>
-              <a:rPr lang="en-US" dirty="0" smtClean="0"/>
-              <a:t>kinematics</a:t>
+              <a:t>Inverse/Forward??? kinematics</a:t>
             </a:r>
             <a:endParaRPr lang="lt-LT" dirty="0" smtClean="0"/>
           </a:p>
@@ -7374,7 +9030,7 @@
 </file>
 
 <file path=ppt/slides/slide9.xml><?xml version="1.0" encoding="utf-8"?>
-<p:sld xmlns:a="http://schemas.openxmlformats.org/drawingml/2006/main" xmlns:r="http://schemas.openxmlformats.org/officeDocument/2006/relationships" xmlns:p="http://schemas.openxmlformats.org/presentationml/2006/main">
+<p:sld xmlns:a="http://schemas.openxmlformats.org/drawingml/2006/main" xmlns:r="http://schemas.openxmlformats.org/officeDocument/2006/relationships" xmlns:mc="http://schemas.openxmlformats.org/markup-compatibility/2006" xmlns:mv="urn:schemas-microsoft-com:mac:vml" xmlns:p="http://schemas.openxmlformats.org/presentationml/2006/main" mc:Ignorable="mv" mc:PreserveAttributes="mv:*">
   <p:cSld>
     <p:spTree>
       <p:nvGrpSpPr>
@@ -7470,6 +9126,13 @@
   <p:clrMapOvr>
     <a:masterClrMapping/>
   </p:clrMapOvr>
+  <p:timing>
+    <p:tnLst>
+      <p:par>
+        <p:cTn id="1" dur="indefinite" restart="never" nodeType="tmRoot"/>
+      </p:par>
+    </p:tnLst>
+  </p:timing>
 </p:sld>
 </file>
 

</xml_diff>